<commit_message>
Making text bigger on slides
</commit_message>
<xml_diff>
--- a/Day_1.pptx
+++ b/Day_1.pptx
@@ -16,11 +16,11 @@
     <p:sldId id="258" r:id="rId7"/>
     <p:sldId id="320" r:id="rId8"/>
     <p:sldId id="259" r:id="rId9"/>
-    <p:sldId id="321" r:id="rId10"/>
-    <p:sldId id="322" r:id="rId11"/>
-    <p:sldId id="323" r:id="rId12"/>
-    <p:sldId id="324" r:id="rId13"/>
-    <p:sldId id="325" r:id="rId14"/>
+    <p:sldId id="341" r:id="rId10"/>
+    <p:sldId id="342" r:id="rId11"/>
+    <p:sldId id="343" r:id="rId12"/>
+    <p:sldId id="344" r:id="rId13"/>
+    <p:sldId id="345" r:id="rId14"/>
     <p:sldId id="260" r:id="rId15"/>
     <p:sldId id="261" r:id="rId16"/>
     <p:sldId id="262" r:id="rId17"/>
@@ -694,7 +694,7 @@
         <p:cNvPr id="1" name="">
           <a:extLst>
             <a:ext uri="{FF2B5EF4-FFF2-40B4-BE49-F238E27FC236}">
-              <a16:creationId xmlns:a16="http://schemas.microsoft.com/office/drawing/2014/main" id="{326D2D45-986A-C512-6854-2912BF873F80}"/>
+              <a16:creationId xmlns:a16="http://schemas.microsoft.com/office/drawing/2014/main" id="{10A91D1E-18CF-8B66-2C09-221008885B9A}"/>
             </a:ext>
           </a:extLst>
         </p:cNvPr>
@@ -714,7 +714,7 @@
           <p:cNvPr id="452" name="PlaceHolder 1">
             <a:extLst>
               <a:ext uri="{FF2B5EF4-FFF2-40B4-BE49-F238E27FC236}">
-                <a16:creationId xmlns:a16="http://schemas.microsoft.com/office/drawing/2014/main" id="{6452A54E-9FE7-6BA1-A373-F797DA00FC56}"/>
+                <a16:creationId xmlns:a16="http://schemas.microsoft.com/office/drawing/2014/main" id="{A3AC463D-9BBA-F425-FB70-022FFBC684FD}"/>
               </a:ext>
             </a:extLst>
           </p:cNvPr>
@@ -743,7 +743,7 @@
           <p:cNvPr id="453" name="PlaceHolder 2">
             <a:extLst>
               <a:ext uri="{FF2B5EF4-FFF2-40B4-BE49-F238E27FC236}">
-                <a16:creationId xmlns:a16="http://schemas.microsoft.com/office/drawing/2014/main" id="{EF4DAB38-B55F-295D-D783-CB75913C388F}"/>
+                <a16:creationId xmlns:a16="http://schemas.microsoft.com/office/drawing/2014/main" id="{467D79CD-DC70-2051-C91F-5C2CE774BCF0}"/>
               </a:ext>
             </a:extLst>
           </p:cNvPr>
@@ -784,7 +784,7 @@
           <p:cNvPr id="454" name="PlaceHolder 3">
             <a:extLst>
               <a:ext uri="{FF2B5EF4-FFF2-40B4-BE49-F238E27FC236}">
-                <a16:creationId xmlns:a16="http://schemas.microsoft.com/office/drawing/2014/main" id="{14FED670-DAC4-9801-AE8D-99383A5B9F3C}"/>
+                <a16:creationId xmlns:a16="http://schemas.microsoft.com/office/drawing/2014/main" id="{CCEDA1AE-C461-4F3B-0D9F-091659F71B5A}"/>
               </a:ext>
             </a:extLst>
           </p:cNvPr>
@@ -845,7 +845,7 @@
     </p:spTree>
     <p:extLst>
       <p:ext uri="{BB962C8B-B14F-4D97-AF65-F5344CB8AC3E}">
-        <p14:creationId xmlns:p14="http://schemas.microsoft.com/office/powerpoint/2010/main" val="2086233993"/>
+        <p14:creationId xmlns:p14="http://schemas.microsoft.com/office/powerpoint/2010/main" val="690390510"/>
       </p:ext>
     </p:extLst>
   </p:cSld>
@@ -3843,7 +3843,7 @@
         <p:cNvPr id="1" name="">
           <a:extLst>
             <a:ext uri="{FF2B5EF4-FFF2-40B4-BE49-F238E27FC236}">
-              <a16:creationId xmlns:a16="http://schemas.microsoft.com/office/drawing/2014/main" id="{926B89D6-3918-DB72-5A59-8EC1B42743AF}"/>
+              <a16:creationId xmlns:a16="http://schemas.microsoft.com/office/drawing/2014/main" id="{8FD5DC1E-99C5-FCAA-1B8E-70D385B5A52D}"/>
             </a:ext>
           </a:extLst>
         </p:cNvPr>
@@ -3863,7 +3863,7 @@
           <p:cNvPr id="452" name="PlaceHolder 1">
             <a:extLst>
               <a:ext uri="{FF2B5EF4-FFF2-40B4-BE49-F238E27FC236}">
-                <a16:creationId xmlns:a16="http://schemas.microsoft.com/office/drawing/2014/main" id="{8A582C6F-FF5E-EA1D-528F-65EEEA506BA4}"/>
+                <a16:creationId xmlns:a16="http://schemas.microsoft.com/office/drawing/2014/main" id="{A09DC863-6346-3201-1B93-6339677AF606}"/>
               </a:ext>
             </a:extLst>
           </p:cNvPr>
@@ -3892,7 +3892,7 @@
           <p:cNvPr id="453" name="PlaceHolder 2">
             <a:extLst>
               <a:ext uri="{FF2B5EF4-FFF2-40B4-BE49-F238E27FC236}">
-                <a16:creationId xmlns:a16="http://schemas.microsoft.com/office/drawing/2014/main" id="{CB659F50-DD87-644B-8C55-9442B0F59075}"/>
+                <a16:creationId xmlns:a16="http://schemas.microsoft.com/office/drawing/2014/main" id="{21758599-C3D9-0B7F-B746-760741E40E3C}"/>
               </a:ext>
             </a:extLst>
           </p:cNvPr>
@@ -3933,7 +3933,7 @@
           <p:cNvPr id="454" name="PlaceHolder 3">
             <a:extLst>
               <a:ext uri="{FF2B5EF4-FFF2-40B4-BE49-F238E27FC236}">
-                <a16:creationId xmlns:a16="http://schemas.microsoft.com/office/drawing/2014/main" id="{B3FAF24F-AF18-81E6-A94A-CBEA586B6D2C}"/>
+                <a16:creationId xmlns:a16="http://schemas.microsoft.com/office/drawing/2014/main" id="{896AB2EA-8E3A-2337-B63E-B5C87130F635}"/>
               </a:ext>
             </a:extLst>
           </p:cNvPr>
@@ -3994,7 +3994,7 @@
     </p:spTree>
     <p:extLst>
       <p:ext uri="{BB962C8B-B14F-4D97-AF65-F5344CB8AC3E}">
-        <p14:creationId xmlns:p14="http://schemas.microsoft.com/office/powerpoint/2010/main" val="4162225193"/>
+        <p14:creationId xmlns:p14="http://schemas.microsoft.com/office/powerpoint/2010/main" val="892432217"/>
       </p:ext>
     </p:extLst>
   </p:cSld>
@@ -4012,7 +4012,7 @@
         <p:cNvPr id="1" name="">
           <a:extLst>
             <a:ext uri="{FF2B5EF4-FFF2-40B4-BE49-F238E27FC236}">
-              <a16:creationId xmlns:a16="http://schemas.microsoft.com/office/drawing/2014/main" id="{D2B1FAF6-D606-901D-6E46-A80CCDE664E7}"/>
+              <a16:creationId xmlns:a16="http://schemas.microsoft.com/office/drawing/2014/main" id="{18D0839F-EA0A-87A4-7110-D79301980C70}"/>
             </a:ext>
           </a:extLst>
         </p:cNvPr>
@@ -4032,7 +4032,7 @@
           <p:cNvPr id="452" name="PlaceHolder 1">
             <a:extLst>
               <a:ext uri="{FF2B5EF4-FFF2-40B4-BE49-F238E27FC236}">
-                <a16:creationId xmlns:a16="http://schemas.microsoft.com/office/drawing/2014/main" id="{FC55AF05-279B-B660-F94F-8C0FF669646D}"/>
+                <a16:creationId xmlns:a16="http://schemas.microsoft.com/office/drawing/2014/main" id="{618C9368-B0F6-30CC-1682-D10E7022F7DA}"/>
               </a:ext>
             </a:extLst>
           </p:cNvPr>
@@ -4061,7 +4061,7 @@
           <p:cNvPr id="453" name="PlaceHolder 2">
             <a:extLst>
               <a:ext uri="{FF2B5EF4-FFF2-40B4-BE49-F238E27FC236}">
-                <a16:creationId xmlns:a16="http://schemas.microsoft.com/office/drawing/2014/main" id="{5372C50D-C425-A0F7-6214-09AC2A1F3BBB}"/>
+                <a16:creationId xmlns:a16="http://schemas.microsoft.com/office/drawing/2014/main" id="{2CF920AB-4D0D-F1A2-549A-9994AD198AFA}"/>
               </a:ext>
             </a:extLst>
           </p:cNvPr>
@@ -4102,7 +4102,7 @@
           <p:cNvPr id="454" name="PlaceHolder 3">
             <a:extLst>
               <a:ext uri="{FF2B5EF4-FFF2-40B4-BE49-F238E27FC236}">
-                <a16:creationId xmlns:a16="http://schemas.microsoft.com/office/drawing/2014/main" id="{271AB4A6-4DBA-DE3A-7904-24E9F03B61EC}"/>
+                <a16:creationId xmlns:a16="http://schemas.microsoft.com/office/drawing/2014/main" id="{F7A1CE95-5E21-876D-AC2E-855E82D1ABAE}"/>
               </a:ext>
             </a:extLst>
           </p:cNvPr>
@@ -4163,7 +4163,7 @@
     </p:spTree>
     <p:extLst>
       <p:ext uri="{BB962C8B-B14F-4D97-AF65-F5344CB8AC3E}">
-        <p14:creationId xmlns:p14="http://schemas.microsoft.com/office/powerpoint/2010/main" val="2559698669"/>
+        <p14:creationId xmlns:p14="http://schemas.microsoft.com/office/powerpoint/2010/main" val="17125938"/>
       </p:ext>
     </p:extLst>
   </p:cSld>
@@ -4181,7 +4181,7 @@
         <p:cNvPr id="1" name="">
           <a:extLst>
             <a:ext uri="{FF2B5EF4-FFF2-40B4-BE49-F238E27FC236}">
-              <a16:creationId xmlns:a16="http://schemas.microsoft.com/office/drawing/2014/main" id="{68A3363F-945F-8116-E0DC-EA65430C92DC}"/>
+              <a16:creationId xmlns:a16="http://schemas.microsoft.com/office/drawing/2014/main" id="{8FC93294-A054-C2EF-DCEB-95393A3127D7}"/>
             </a:ext>
           </a:extLst>
         </p:cNvPr>
@@ -4201,7 +4201,7 @@
           <p:cNvPr id="452" name="PlaceHolder 1">
             <a:extLst>
               <a:ext uri="{FF2B5EF4-FFF2-40B4-BE49-F238E27FC236}">
-                <a16:creationId xmlns:a16="http://schemas.microsoft.com/office/drawing/2014/main" id="{87D174F5-8AE4-E130-4878-4D6F8CDE7380}"/>
+                <a16:creationId xmlns:a16="http://schemas.microsoft.com/office/drawing/2014/main" id="{649EDF88-999B-F777-127D-53F34DF659C7}"/>
               </a:ext>
             </a:extLst>
           </p:cNvPr>
@@ -4230,7 +4230,7 @@
           <p:cNvPr id="453" name="PlaceHolder 2">
             <a:extLst>
               <a:ext uri="{FF2B5EF4-FFF2-40B4-BE49-F238E27FC236}">
-                <a16:creationId xmlns:a16="http://schemas.microsoft.com/office/drawing/2014/main" id="{449228A1-7919-2012-E894-419678A4A487}"/>
+                <a16:creationId xmlns:a16="http://schemas.microsoft.com/office/drawing/2014/main" id="{7453032E-37BF-1839-7AC9-790ACB14AAF0}"/>
               </a:ext>
             </a:extLst>
           </p:cNvPr>
@@ -4271,7 +4271,7 @@
           <p:cNvPr id="454" name="PlaceHolder 3">
             <a:extLst>
               <a:ext uri="{FF2B5EF4-FFF2-40B4-BE49-F238E27FC236}">
-                <a16:creationId xmlns:a16="http://schemas.microsoft.com/office/drawing/2014/main" id="{09028F26-E3FD-4495-0975-9A3DA59149D7}"/>
+                <a16:creationId xmlns:a16="http://schemas.microsoft.com/office/drawing/2014/main" id="{659CDB4F-A4FF-60EE-342B-6D1E34C9C11F}"/>
               </a:ext>
             </a:extLst>
           </p:cNvPr>
@@ -4332,7 +4332,7 @@
     </p:spTree>
     <p:extLst>
       <p:ext uri="{BB962C8B-B14F-4D97-AF65-F5344CB8AC3E}">
-        <p14:creationId xmlns:p14="http://schemas.microsoft.com/office/powerpoint/2010/main" val="993714473"/>
+        <p14:creationId xmlns:p14="http://schemas.microsoft.com/office/powerpoint/2010/main" val="661032418"/>
       </p:ext>
     </p:extLst>
   </p:cSld>
@@ -4350,7 +4350,7 @@
         <p:cNvPr id="1" name="">
           <a:extLst>
             <a:ext uri="{FF2B5EF4-FFF2-40B4-BE49-F238E27FC236}">
-              <a16:creationId xmlns:a16="http://schemas.microsoft.com/office/drawing/2014/main" id="{A02632E9-64F8-83FE-A295-24A256043D06}"/>
+              <a16:creationId xmlns:a16="http://schemas.microsoft.com/office/drawing/2014/main" id="{FE5042CE-4176-3DB8-E602-FCF1F062B0CA}"/>
             </a:ext>
           </a:extLst>
         </p:cNvPr>
@@ -4370,7 +4370,7 @@
           <p:cNvPr id="452" name="PlaceHolder 1">
             <a:extLst>
               <a:ext uri="{FF2B5EF4-FFF2-40B4-BE49-F238E27FC236}">
-                <a16:creationId xmlns:a16="http://schemas.microsoft.com/office/drawing/2014/main" id="{6055B439-AB62-C855-EF6D-DA8B63C3BB35}"/>
+                <a16:creationId xmlns:a16="http://schemas.microsoft.com/office/drawing/2014/main" id="{1B9657DD-D8F0-421A-D4E3-CC35A719A7DA}"/>
               </a:ext>
             </a:extLst>
           </p:cNvPr>
@@ -4399,7 +4399,7 @@
           <p:cNvPr id="453" name="PlaceHolder 2">
             <a:extLst>
               <a:ext uri="{FF2B5EF4-FFF2-40B4-BE49-F238E27FC236}">
-                <a16:creationId xmlns:a16="http://schemas.microsoft.com/office/drawing/2014/main" id="{3983CC62-1826-3503-0061-36DAB463164C}"/>
+                <a16:creationId xmlns:a16="http://schemas.microsoft.com/office/drawing/2014/main" id="{A72881B1-F8B3-034F-66BF-9916384B5C74}"/>
               </a:ext>
             </a:extLst>
           </p:cNvPr>
@@ -4440,7 +4440,7 @@
           <p:cNvPr id="454" name="PlaceHolder 3">
             <a:extLst>
               <a:ext uri="{FF2B5EF4-FFF2-40B4-BE49-F238E27FC236}">
-                <a16:creationId xmlns:a16="http://schemas.microsoft.com/office/drawing/2014/main" id="{63BD3C55-26AC-CD60-A375-F33AB4C9DC19}"/>
+                <a16:creationId xmlns:a16="http://schemas.microsoft.com/office/drawing/2014/main" id="{BECCCEE5-FAAE-AF64-A121-D8D98C596FFC}"/>
               </a:ext>
             </a:extLst>
           </p:cNvPr>
@@ -4501,7 +4501,7 @@
     </p:spTree>
     <p:extLst>
       <p:ext uri="{BB962C8B-B14F-4D97-AF65-F5344CB8AC3E}">
-        <p14:creationId xmlns:p14="http://schemas.microsoft.com/office/powerpoint/2010/main" val="3135199411"/>
+        <p14:creationId xmlns:p14="http://schemas.microsoft.com/office/powerpoint/2010/main" val="950422278"/>
       </p:ext>
     </p:extLst>
   </p:cSld>
@@ -16764,7 +16764,7 @@
         <p:cNvPr id="1" name="">
           <a:extLst>
             <a:ext uri="{FF2B5EF4-FFF2-40B4-BE49-F238E27FC236}">
-              <a16:creationId xmlns:a16="http://schemas.microsoft.com/office/drawing/2014/main" id="{2F85DCBF-FB92-87D5-2A9E-49E46B81F0E9}"/>
+              <a16:creationId xmlns:a16="http://schemas.microsoft.com/office/drawing/2014/main" id="{8AF1CE2C-A6A7-1BD1-A55E-2FEF8D678DBE}"/>
             </a:ext>
           </a:extLst>
         </p:cNvPr>
@@ -16784,7 +16784,7 @@
           <p:cNvPr id="225" name="PlaceHolder 1">
             <a:extLst>
               <a:ext uri="{FF2B5EF4-FFF2-40B4-BE49-F238E27FC236}">
-                <a16:creationId xmlns:a16="http://schemas.microsoft.com/office/drawing/2014/main" id="{DD4DD5CF-8D2A-18A3-16C3-079ACA7FD3E2}"/>
+                <a16:creationId xmlns:a16="http://schemas.microsoft.com/office/drawing/2014/main" id="{41CD1C21-D840-650F-E42C-7935DEC7A1BE}"/>
               </a:ext>
             </a:extLst>
           </p:cNvPr>
@@ -16844,7 +16844,7 @@
           <p:cNvPr id="226" name="PlaceHolder 2">
             <a:extLst>
               <a:ext uri="{FF2B5EF4-FFF2-40B4-BE49-F238E27FC236}">
-                <a16:creationId xmlns:a16="http://schemas.microsoft.com/office/drawing/2014/main" id="{0744F305-75B6-E647-7A1D-8AB94BC4A9D6}"/>
+                <a16:creationId xmlns:a16="http://schemas.microsoft.com/office/drawing/2014/main" id="{96C9C126-A3C8-3C08-7FFE-6BA4AC1FA52F}"/>
               </a:ext>
             </a:extLst>
           </p:cNvPr>
@@ -16857,8 +16857,8 @@
         </p:nvSpPr>
         <p:spPr>
           <a:xfrm>
-            <a:off x="1322280" y="2763000"/>
-            <a:ext cx="3646080" cy="3406680"/>
+            <a:off x="275573" y="2388960"/>
+            <a:ext cx="4692787" cy="4200840"/>
           </a:xfrm>
           <a:prstGeom prst="rect">
             <a:avLst/>
@@ -16870,7 +16870,7 @@
         </p:spPr>
         <p:txBody>
           <a:bodyPr anchor="t">
-            <a:normAutofit/>
+            <a:normAutofit lnSpcReduction="10000"/>
           </a:bodyPr>
           <a:lstStyle/>
           <a:p>
@@ -16888,7 +16888,7 @@
               <a:buChar char="•"/>
             </a:pPr>
             <a:r>
-              <a:rPr lang="en-US" sz="1800" b="0" strike="noStrike" spc="49" dirty="0">
+              <a:rPr lang="en-US" b="0" strike="noStrike" spc="49" dirty="0">
                 <a:solidFill>
                   <a:srgbClr val="000000"/>
                 </a:solidFill>
@@ -16898,7 +16898,7 @@
               <a:t>Git is a version </a:t>
             </a:r>
             <a:r>
-              <a:rPr lang="en-US" sz="1800" spc="49" dirty="0">
+              <a:rPr lang="en-US" spc="49" dirty="0">
                 <a:solidFill>
                   <a:srgbClr val="000000"/>
                 </a:solidFill>
@@ -16908,7 +16908,7 @@
               <a:t>c</a:t>
             </a:r>
             <a:r>
-              <a:rPr lang="en-US" sz="1800" b="0" strike="noStrike" spc="49" dirty="0">
+              <a:rPr lang="en-US" b="0" strike="noStrike" spc="49" dirty="0">
                 <a:solidFill>
                   <a:srgbClr val="000000"/>
                 </a:solidFill>
@@ -16933,7 +16933,7 @@
               <a:buChar char="•"/>
             </a:pPr>
             <a:r>
-              <a:rPr lang="en-US" sz="1800" spc="49" dirty="0">
+              <a:rPr lang="en-US" spc="49" dirty="0">
                 <a:solidFill>
                   <a:srgbClr val="000000"/>
                 </a:solidFill>
@@ -16941,7 +16941,7 @@
               </a:rPr>
               <a:t>It tracks changes to files and allows collaboration</a:t>
             </a:r>
-            <a:endParaRPr lang="en-US" sz="1800" b="0" strike="noStrike" spc="-1" dirty="0">
+            <a:endParaRPr lang="en-US" b="0" strike="noStrike" spc="-1" dirty="0">
               <a:solidFill>
                 <a:srgbClr val="000000"/>
               </a:solidFill>
@@ -16963,7 +16963,7 @@
               <a:buChar char="•"/>
             </a:pPr>
             <a:r>
-              <a:rPr lang="en-US" sz="1800" b="0" strike="noStrike" spc="49" dirty="0">
+              <a:rPr lang="en-US" b="0" strike="noStrike" spc="49" dirty="0">
                 <a:solidFill>
                   <a:srgbClr val="000000"/>
                 </a:solidFill>
@@ -16988,7 +16988,7 @@
               <a:buChar char="•"/>
             </a:pPr>
             <a:r>
-              <a:rPr lang="en-US" sz="1800" b="0" strike="noStrike" spc="49" dirty="0">
+              <a:rPr lang="en-US" b="0" strike="noStrike" spc="49" dirty="0">
                 <a:solidFill>
                   <a:srgbClr val="000000"/>
                 </a:solidFill>
@@ -16997,7 +16997,7 @@
               </a:rPr>
               <a:t>Commits create “snapshots” of the entire project, not just the differences</a:t>
             </a:r>
-            <a:endParaRPr lang="en-US" sz="1800" b="0" strike="noStrike" spc="-1" dirty="0">
+            <a:endParaRPr lang="en-US" b="0" strike="noStrike" spc="-1" dirty="0">
               <a:solidFill>
                 <a:srgbClr val="000000"/>
               </a:solidFill>
@@ -17019,7 +17019,7 @@
               <a:buChar char="•"/>
             </a:pPr>
             <a:r>
-              <a:rPr lang="en-US" sz="1800" b="0" strike="noStrike" spc="49" dirty="0">
+              <a:rPr lang="en-US" b="0" strike="noStrike" spc="49" dirty="0">
                 <a:solidFill>
                   <a:srgbClr val="000000"/>
                 </a:solidFill>
@@ -17028,7 +17028,7 @@
               </a:rPr>
               <a:t>Can be stored in a remote location</a:t>
             </a:r>
-            <a:endParaRPr lang="en-US" sz="1800" b="0" strike="noStrike" spc="-1" dirty="0">
+            <a:endParaRPr lang="en-US" b="0" strike="noStrike" spc="-1" dirty="0">
               <a:solidFill>
                 <a:srgbClr val="000000"/>
               </a:solidFill>
@@ -17042,7 +17042,7 @@
           <p:cNvPr id="227" name="PlaceHolder 3">
             <a:extLst>
               <a:ext uri="{FF2B5EF4-FFF2-40B4-BE49-F238E27FC236}">
-                <a16:creationId xmlns:a16="http://schemas.microsoft.com/office/drawing/2014/main" id="{757F3131-73FD-DEF4-9F5B-8C0D51FE35B9}"/>
+                <a16:creationId xmlns:a16="http://schemas.microsoft.com/office/drawing/2014/main" id="{47352189-BC25-483C-7D34-8223879686B3}"/>
               </a:ext>
             </a:extLst>
           </p:cNvPr>
@@ -17111,7 +17111,7 @@
           <p:cNvPr id="228" name="Picture 3" descr="Git">
             <a:extLst>
               <a:ext uri="{FF2B5EF4-FFF2-40B4-BE49-F238E27FC236}">
-                <a16:creationId xmlns:a16="http://schemas.microsoft.com/office/drawing/2014/main" id="{EBCDF507-458E-3393-89E1-E1DD17904D10}"/>
+                <a16:creationId xmlns:a16="http://schemas.microsoft.com/office/drawing/2014/main" id="{99023D7C-BF8D-B3D3-81C7-18E89CA2A12E}"/>
               </a:ext>
             </a:extLst>
           </p:cNvPr>
@@ -17140,7 +17140,7 @@
           <p:cNvPr id="229" name="Picture 4" descr="A screenshot of a diagram&#10;&#10;Description automatically generated">
             <a:extLst>
               <a:ext uri="{FF2B5EF4-FFF2-40B4-BE49-F238E27FC236}">
-                <a16:creationId xmlns:a16="http://schemas.microsoft.com/office/drawing/2014/main" id="{552A6015-A504-DE67-BA8A-F69AEE20EFF3}"/>
+                <a16:creationId xmlns:a16="http://schemas.microsoft.com/office/drawing/2014/main" id="{F44B5DB2-F0C9-A55B-964C-CE16A59348EB}"/>
               </a:ext>
             </a:extLst>
           </p:cNvPr>
@@ -17169,7 +17169,7 @@
           <p:cNvPr id="2" name="Rectangle 1">
             <a:extLst>
               <a:ext uri="{FF2B5EF4-FFF2-40B4-BE49-F238E27FC236}">
-                <a16:creationId xmlns:a16="http://schemas.microsoft.com/office/drawing/2014/main" id="{C5A65254-5245-AF25-9FF8-5B27D7E8CF78}"/>
+                <a16:creationId xmlns:a16="http://schemas.microsoft.com/office/drawing/2014/main" id="{7348DB64-3022-5B10-BD46-14ECBF833EA4}"/>
               </a:ext>
             </a:extLst>
           </p:cNvPr>
@@ -17178,7 +17178,7 @@
         </p:nvSpPr>
         <p:spPr>
           <a:xfrm>
-            <a:off x="10243927" y="3187080"/>
+            <a:off x="10334111" y="3187080"/>
             <a:ext cx="1232452" cy="2723390"/>
           </a:xfrm>
           <a:prstGeom prst="rect">
@@ -17219,7 +17219,7 @@
     </p:spTree>
     <p:extLst>
       <p:ext uri="{BB962C8B-B14F-4D97-AF65-F5344CB8AC3E}">
-        <p14:creationId xmlns:p14="http://schemas.microsoft.com/office/powerpoint/2010/main" val="1465448543"/>
+        <p14:creationId xmlns:p14="http://schemas.microsoft.com/office/powerpoint/2010/main" val="2739739185"/>
       </p:ext>
     </p:extLst>
   </p:cSld>
@@ -17259,7 +17259,7 @@
         <p:spPr>
           <a:xfrm>
             <a:off x="1322280" y="1130940"/>
-            <a:ext cx="7287840" cy="2120760"/>
+            <a:ext cx="7287840" cy="1263420"/>
           </a:xfrm>
           <a:prstGeom prst="rect">
             <a:avLst/>
@@ -17311,8 +17311,8 @@
         </p:nvSpPr>
         <p:spPr>
           <a:xfrm>
-            <a:off x="526850" y="3601800"/>
-            <a:ext cx="3645370" cy="2441191"/>
+            <a:off x="526850" y="2794140"/>
+            <a:ext cx="3645370" cy="3927060"/>
           </a:xfrm>
           <a:prstGeom prst="rect">
             <a:avLst/>
@@ -17342,7 +17342,7 @@
               <a:buChar char="•"/>
             </a:pPr>
             <a:r>
-              <a:rPr lang="en-US" sz="1800" b="0" strike="noStrike" spc="49" dirty="0">
+              <a:rPr lang="en-US" b="0" strike="noStrike" spc="49" dirty="0">
                 <a:solidFill>
                   <a:srgbClr val="000000"/>
                 </a:solidFill>
@@ -17367,7 +17367,7 @@
               <a:buChar char="•"/>
             </a:pPr>
             <a:r>
-              <a:rPr lang="en-US" sz="1800" b="0" strike="noStrike" spc="49" dirty="0">
+              <a:rPr lang="en-US" b="0" strike="noStrike" spc="49" dirty="0">
                 <a:solidFill>
                   <a:srgbClr val="000000"/>
                 </a:solidFill>
@@ -17376,7 +17376,7 @@
               </a:rPr>
               <a:t>Online (Remote) and free</a:t>
             </a:r>
-            <a:endParaRPr lang="en-US" sz="1800" b="0" strike="noStrike" spc="-1" dirty="0">
+            <a:endParaRPr lang="en-US" b="0" strike="noStrike" spc="-1" dirty="0">
               <a:solidFill>
                 <a:srgbClr val="000000"/>
               </a:solidFill>
@@ -17398,7 +17398,7 @@
               <a:buChar char="•"/>
             </a:pPr>
             <a:r>
-              <a:rPr lang="en-US" sz="1800" b="0" strike="noStrike" spc="49" dirty="0">
+              <a:rPr lang="en-US" b="0" strike="noStrike" spc="49" dirty="0">
                 <a:solidFill>
                   <a:srgbClr val="000000"/>
                 </a:solidFill>
@@ -17407,7 +17407,7 @@
               </a:rPr>
               <a:t>Collaboration</a:t>
             </a:r>
-            <a:endParaRPr lang="en-US" sz="1800" b="0" strike="noStrike" spc="-1" dirty="0">
+            <a:endParaRPr lang="en-US" b="0" strike="noStrike" spc="-1" dirty="0">
               <a:solidFill>
                 <a:srgbClr val="000000"/>
               </a:solidFill>
@@ -17429,7 +17429,7 @@
               <a:buChar char="•"/>
             </a:pPr>
             <a:r>
-              <a:rPr lang="en-US" sz="1800" b="0" strike="noStrike" spc="49" dirty="0">
+              <a:rPr lang="en-US" b="0" strike="noStrike" spc="49" dirty="0">
                 <a:solidFill>
                   <a:srgbClr val="000000"/>
                 </a:solidFill>
@@ -17438,7 +17438,7 @@
               </a:rPr>
               <a:t>Find other repositories (Course Materials)</a:t>
             </a:r>
-            <a:endParaRPr lang="en-US" sz="1800" b="0" strike="noStrike" spc="-1" dirty="0">
+            <a:endParaRPr lang="en-US" b="0" strike="noStrike" spc="-1" dirty="0">
               <a:solidFill>
                 <a:srgbClr val="000000"/>
               </a:solidFill>
@@ -17460,7 +17460,7 @@
               <a:buChar char="•"/>
             </a:pPr>
             <a:r>
-              <a:rPr lang="en-US" sz="1800" b="0" strike="noStrike" spc="49" dirty="0">
+              <a:rPr lang="en-US" b="0" strike="noStrike" spc="49" dirty="0">
                 <a:solidFill>
                   <a:srgbClr val="000000"/>
                 </a:solidFill>
@@ -17469,7 +17469,7 @@
               </a:rPr>
               <a:t>Personal Portfolio</a:t>
             </a:r>
-            <a:endParaRPr lang="en-US" sz="1800" b="0" strike="noStrike" spc="-1" dirty="0">
+            <a:endParaRPr lang="en-US" b="0" strike="noStrike" spc="-1" dirty="0">
               <a:solidFill>
                 <a:srgbClr val="000000"/>
               </a:solidFill>
@@ -17486,7 +17486,7 @@
               </a:spcBef>
               <a:buNone/>
             </a:pPr>
-            <a:endParaRPr lang="en-US" sz="1800" b="0" strike="noStrike" spc="-1" dirty="0">
+            <a:endParaRPr lang="en-US" sz="2400" b="0" strike="noStrike" spc="-1" dirty="0">
               <a:solidFill>
                 <a:srgbClr val="000000"/>
               </a:solidFill>
@@ -17503,7 +17503,7 @@
               </a:spcBef>
               <a:buNone/>
             </a:pPr>
-            <a:endParaRPr lang="en-US" sz="1800" b="0" strike="noStrike" spc="-1" dirty="0">
+            <a:endParaRPr lang="en-US" sz="2400" b="0" strike="noStrike" spc="-1" dirty="0">
               <a:solidFill>
                 <a:srgbClr val="000000"/>
               </a:solidFill>
@@ -17520,7 +17520,7 @@
               </a:spcBef>
               <a:buNone/>
             </a:pPr>
-            <a:endParaRPr lang="en-US" sz="1800" b="0" strike="noStrike" spc="-1" dirty="0">
+            <a:endParaRPr lang="en-US" sz="2400" b="0" strike="noStrike" spc="-1" dirty="0">
               <a:solidFill>
                 <a:srgbClr val="000000"/>
               </a:solidFill>
@@ -17604,8 +17604,8 @@
         </p:blipFill>
         <p:spPr>
           <a:xfrm>
-            <a:off x="4823280" y="0"/>
-            <a:ext cx="7371000" cy="6857640"/>
+            <a:off x="4966200" y="0"/>
+            <a:ext cx="9149997" cy="8809463"/>
           </a:xfrm>
           <a:prstGeom prst="rect">
             <a:avLst/>
@@ -17623,8 +17623,8 @@
         </p:nvSpPr>
         <p:spPr>
           <a:xfrm>
-            <a:off x="5492160" y="663120"/>
-            <a:ext cx="1253160" cy="226440"/>
+            <a:off x="5860150" y="904500"/>
+            <a:ext cx="1477352" cy="226440"/>
           </a:xfrm>
           <a:prstGeom prst="rect">
             <a:avLst/>
@@ -17666,7 +17666,7 @@
         </p:nvSpPr>
         <p:spPr>
           <a:xfrm>
-            <a:off x="4413600" y="643320"/>
+            <a:off x="4561657" y="904500"/>
             <a:ext cx="385560" cy="266760"/>
           </a:xfrm>
           <a:prstGeom prst="rightArrow">
@@ -17714,31 +17714,30 @@
         </p:nvSpPr>
         <p:spPr>
           <a:xfrm>
-            <a:off x="2554920" y="588960"/>
-            <a:ext cx="1933560" cy="639720"/>
-          </a:xfrm>
-          <a:prstGeom prst="rect">
-            <a:avLst/>
-          </a:prstGeom>
-          <a:noFill/>
-          <a:ln w="0">
-            <a:noFill/>
-          </a:ln>
+            <a:off x="2205680" y="821446"/>
+            <a:ext cx="2381852" cy="461665"/>
+          </a:xfrm>
+          <a:prstGeom prst="rect">
+            <a:avLst/>
+          </a:prstGeom>
+          <a:ln/>
         </p:spPr>
         <p:style>
-          <a:lnRef idx="0">
-            <a:scrgbClr r="0" g="0" b="0"/>
+          <a:lnRef idx="2">
+            <a:schemeClr val="dk1"/>
           </a:lnRef>
-          <a:fillRef idx="0">
-            <a:scrgbClr r="0" g="0" b="0"/>
+          <a:fillRef idx="1">
+            <a:schemeClr val="lt1"/>
           </a:fillRef>
           <a:effectRef idx="0">
-            <a:scrgbClr r="0" g="0" b="0"/>
+            <a:schemeClr val="dk1"/>
           </a:effectRef>
-          <a:fontRef idx="minor"/>
+          <a:fontRef idx="minor">
+            <a:schemeClr val="dk1"/>
+          </a:fontRef>
         </p:style>
         <p:txBody>
-          <a:bodyPr vertOverflow="overflow" horzOverflow="overflow" numCol="1" spcCol="0" anchor="t">
+          <a:bodyPr vertOverflow="overflow" horzOverflow="overflow" wrap="square" numCol="1" spcCol="0" anchor="t">
             <a:spAutoFit/>
           </a:bodyPr>
           <a:lstStyle/>
@@ -17750,7 +17749,7 @@
               <a:buNone/>
             </a:pPr>
             <a:r>
-              <a:rPr lang="en-US" sz="1800" b="1" strike="noStrike" spc="-1">
+              <a:rPr lang="en-US" sz="2400" b="1" strike="noStrike" spc="-1" dirty="0">
                 <a:solidFill>
                   <a:srgbClr val="000000"/>
                 </a:solidFill>
@@ -17758,7 +17757,7 @@
               </a:rPr>
               <a:t>User/Repository </a:t>
             </a:r>
-            <a:endParaRPr lang="en-US" sz="1800" b="0" strike="noStrike" spc="-1">
+            <a:endParaRPr lang="en-US" sz="2400" b="0" strike="noStrike" spc="-1" dirty="0">
               <a:latin typeface="Arial"/>
             </a:endParaRPr>
           </a:p>
@@ -17772,8 +17771,8 @@
         </p:nvSpPr>
         <p:spPr>
           <a:xfrm>
-            <a:off x="5074920" y="2540880"/>
-            <a:ext cx="1253160" cy="1060920"/>
+            <a:off x="5208406" y="3240505"/>
+            <a:ext cx="1477351" cy="1376100"/>
           </a:xfrm>
           <a:prstGeom prst="rect">
             <a:avLst/>
@@ -17815,7 +17814,7 @@
         </p:nvSpPr>
         <p:spPr>
           <a:xfrm>
-            <a:off x="4404600" y="3153960"/>
+            <a:off x="4566420" y="3753360"/>
             <a:ext cx="385560" cy="266760"/>
           </a:xfrm>
           <a:prstGeom prst="rightArrow">
@@ -17863,31 +17862,30 @@
         </p:nvSpPr>
         <p:spPr>
           <a:xfrm>
-            <a:off x="3429000" y="3081960"/>
-            <a:ext cx="1059120" cy="366120"/>
-          </a:xfrm>
-          <a:prstGeom prst="rect">
-            <a:avLst/>
-          </a:prstGeom>
-          <a:noFill/>
-          <a:ln w="0">
-            <a:noFill/>
-          </a:ln>
+            <a:off x="3785977" y="3655907"/>
+            <a:ext cx="801555" cy="461665"/>
+          </a:xfrm>
+          <a:prstGeom prst="rect">
+            <a:avLst/>
+          </a:prstGeom>
+          <a:ln/>
         </p:spPr>
         <p:style>
-          <a:lnRef idx="0">
-            <a:scrgbClr r="0" g="0" b="0"/>
+          <a:lnRef idx="2">
+            <a:schemeClr val="dk1"/>
           </a:lnRef>
-          <a:fillRef idx="0">
-            <a:scrgbClr r="0" g="0" b="0"/>
+          <a:fillRef idx="1">
+            <a:schemeClr val="lt1"/>
           </a:fillRef>
           <a:effectRef idx="0">
-            <a:scrgbClr r="0" g="0" b="0"/>
+            <a:schemeClr val="dk1"/>
           </a:effectRef>
-          <a:fontRef idx="minor"/>
+          <a:fontRef idx="minor">
+            <a:schemeClr val="dk1"/>
+          </a:fontRef>
         </p:style>
         <p:txBody>
-          <a:bodyPr vertOverflow="overflow" horzOverflow="overflow" numCol="1" spcCol="0" anchor="t">
+          <a:bodyPr vertOverflow="overflow" horzOverflow="overflow" wrap="square" numCol="1" spcCol="0" anchor="t">
             <a:spAutoFit/>
           </a:bodyPr>
           <a:lstStyle/>
@@ -17899,15 +17897,24 @@
               <a:buNone/>
             </a:pPr>
             <a:r>
-              <a:rPr lang="en-US" sz="1800" b="1" strike="noStrike" spc="-1">
+              <a:rPr lang="en-US" sz="2400" b="1" strike="noStrike" spc="-1" dirty="0">
                 <a:solidFill>
                   <a:srgbClr val="000000"/>
                 </a:solidFill>
                 <a:latin typeface="Tenorite"/>
               </a:rPr>
-              <a:t>Files </a:t>
+              <a:t>Files</a:t>
             </a:r>
-            <a:endParaRPr lang="en-US" sz="1800" b="0" strike="noStrike" spc="-1">
+            <a:r>
+              <a:rPr lang="en-US" sz="1800" b="1" strike="noStrike" spc="-1" dirty="0">
+                <a:solidFill>
+                  <a:srgbClr val="000000"/>
+                </a:solidFill>
+                <a:latin typeface="Tenorite"/>
+              </a:rPr>
+              <a:t> </a:t>
+            </a:r>
+            <a:endParaRPr lang="en-US" sz="1800" b="0" strike="noStrike" spc="-1" dirty="0">
               <a:latin typeface="Arial"/>
             </a:endParaRPr>
           </a:p>
@@ -17925,7 +17932,7 @@
         </p:blipFill>
         <p:spPr>
           <a:xfrm>
-            <a:off x="249650" y="2794140"/>
+            <a:off x="448920" y="1942370"/>
             <a:ext cx="554400" cy="554400"/>
           </a:xfrm>
           <a:prstGeom prst="rect">
@@ -18026,8 +18033,8 @@
         </p:nvSpPr>
         <p:spPr>
           <a:xfrm>
-            <a:off x="1322280" y="2472840"/>
-            <a:ext cx="6924960" cy="3696840"/>
+            <a:off x="1322279" y="2141951"/>
+            <a:ext cx="8097293" cy="4447849"/>
           </a:xfrm>
           <a:prstGeom prst="rect">
             <a:avLst/>
@@ -18057,7 +18064,7 @@
               <a:buChar char="•"/>
             </a:pPr>
             <a:r>
-              <a:rPr lang="en-US" sz="1800" b="1" strike="noStrike" spc="49" dirty="0">
+              <a:rPr lang="en-US" b="1" strike="noStrike" spc="49" dirty="0">
                 <a:solidFill>
                   <a:srgbClr val="000000"/>
                 </a:solidFill>
@@ -18066,7 +18073,7 @@
               <a:t>Repository:</a:t>
             </a:r>
             <a:r>
-              <a:rPr lang="en-US" sz="1800" b="0" strike="noStrike" spc="49" dirty="0">
+              <a:rPr lang="en-US" b="0" strike="noStrike" spc="49" dirty="0">
                 <a:solidFill>
                   <a:srgbClr val="000000"/>
                 </a:solidFill>
@@ -18074,7 +18081,7 @@
               </a:rPr>
               <a:t> A file of files</a:t>
             </a:r>
-            <a:endParaRPr lang="en-US" sz="1800" b="0" strike="noStrike" spc="-1" dirty="0">
+            <a:endParaRPr lang="en-US" b="0" strike="noStrike" spc="-1" dirty="0">
               <a:solidFill>
                 <a:srgbClr val="000000"/>
               </a:solidFill>
@@ -18096,7 +18103,7 @@
               <a:buChar char="•"/>
             </a:pPr>
             <a:r>
-              <a:rPr lang="en-US" sz="1800" b="1" strike="noStrike" spc="49" dirty="0">
+              <a:rPr lang="en-US" b="1" strike="noStrike" spc="49" dirty="0">
                 <a:solidFill>
                   <a:srgbClr val="000000"/>
                 </a:solidFill>
@@ -18105,7 +18112,7 @@
               <a:t>Clone:</a:t>
             </a:r>
             <a:r>
-              <a:rPr lang="en-US" sz="1800" b="0" strike="noStrike" spc="49" dirty="0">
+              <a:rPr lang="en-US" b="0" strike="noStrike" spc="49" dirty="0">
                 <a:solidFill>
                   <a:srgbClr val="000000"/>
                 </a:solidFill>
@@ -18113,7 +18120,7 @@
               </a:rPr>
               <a:t> Create an exact copy of your repository on your local computer</a:t>
             </a:r>
-            <a:endParaRPr lang="en-US" sz="1800" b="0" strike="noStrike" spc="-1" dirty="0">
+            <a:endParaRPr lang="en-US" b="0" strike="noStrike" spc="-1" dirty="0">
               <a:solidFill>
                 <a:srgbClr val="000000"/>
               </a:solidFill>
@@ -18135,7 +18142,7 @@
               <a:buChar char="•"/>
             </a:pPr>
             <a:r>
-              <a:rPr lang="en-US" sz="1800" b="1" strike="noStrike" spc="49" dirty="0">
+              <a:rPr lang="en-US" b="1" strike="noStrike" spc="49" dirty="0">
                 <a:solidFill>
                   <a:srgbClr val="000000"/>
                 </a:solidFill>
@@ -18144,7 +18151,7 @@
               <a:t>Pull:</a:t>
             </a:r>
             <a:r>
-              <a:rPr lang="en-US" sz="1800" b="0" strike="noStrike" spc="49" dirty="0">
+              <a:rPr lang="en-US" b="0" strike="noStrike" spc="49" dirty="0">
                 <a:solidFill>
                   <a:srgbClr val="000000"/>
                 </a:solidFill>
@@ -18152,7 +18159,7 @@
               </a:rPr>
               <a:t> Pulls new content from a remote repository</a:t>
             </a:r>
-            <a:endParaRPr lang="en-US" sz="1800" b="0" strike="noStrike" spc="-1" dirty="0">
+            <a:endParaRPr lang="en-US" b="0" strike="noStrike" spc="-1" dirty="0">
               <a:solidFill>
                 <a:srgbClr val="000000"/>
               </a:solidFill>
@@ -18174,7 +18181,7 @@
               <a:buChar char="•"/>
             </a:pPr>
             <a:r>
-              <a:rPr lang="en-US" sz="1800" b="1" strike="noStrike" spc="49" dirty="0">
+              <a:rPr lang="en-US" b="1" strike="noStrike" spc="49" dirty="0">
                 <a:solidFill>
                   <a:srgbClr val="000000"/>
                 </a:solidFill>
@@ -18183,7 +18190,7 @@
               <a:t>Push:</a:t>
             </a:r>
             <a:r>
-              <a:rPr lang="en-US" sz="1800" b="0" strike="noStrike" spc="49" dirty="0">
+              <a:rPr lang="en-US" b="0" strike="noStrike" spc="49" dirty="0">
                 <a:solidFill>
                   <a:srgbClr val="000000"/>
                 </a:solidFill>
@@ -18191,7 +18198,7 @@
               </a:rPr>
               <a:t> Pushes new content from your local computer to a remote</a:t>
             </a:r>
-            <a:endParaRPr lang="en-US" sz="1800" b="0" strike="noStrike" spc="-1" dirty="0">
+            <a:endParaRPr lang="en-US" b="0" strike="noStrike" spc="-1" dirty="0">
               <a:solidFill>
                 <a:srgbClr val="000000"/>
               </a:solidFill>
@@ -18213,7 +18220,7 @@
               <a:buChar char="•"/>
             </a:pPr>
             <a:r>
-              <a:rPr lang="en-US" sz="1800" b="1" strike="noStrike" spc="49" dirty="0">
+              <a:rPr lang="en-US" b="1" strike="noStrike" spc="49" dirty="0">
                 <a:solidFill>
                   <a:srgbClr val="000000"/>
                 </a:solidFill>
@@ -18222,7 +18229,7 @@
               <a:t>Branching:</a:t>
             </a:r>
             <a:r>
-              <a:rPr lang="en-US" sz="1800" b="0" strike="noStrike" spc="49" dirty="0">
+              <a:rPr lang="en-US" b="0" strike="noStrike" spc="49" dirty="0">
                 <a:solidFill>
                   <a:srgbClr val="000000"/>
                 </a:solidFill>
@@ -18231,7 +18238,7 @@
               <a:t> Duplicates an exact copy a repository in the same repository and allows you to make changes without altering the main-</a:t>
             </a:r>
             <a:r>
-              <a:rPr lang="en-US" sz="1800" b="1" strike="noStrike" spc="49" dirty="0">
+              <a:rPr lang="en-US" b="1" strike="noStrike" spc="49" dirty="0">
                 <a:solidFill>
                   <a:srgbClr val="000000"/>
                 </a:solidFill>
@@ -18239,7 +18246,7 @@
               </a:rPr>
               <a:t>Covered Next Session</a:t>
             </a:r>
-            <a:endParaRPr lang="en-US" sz="1800" b="0" strike="noStrike" spc="-1" dirty="0">
+            <a:endParaRPr lang="en-US" b="0" strike="noStrike" spc="-1" dirty="0">
               <a:solidFill>
                 <a:srgbClr val="000000"/>
               </a:solidFill>
@@ -18261,7 +18268,7 @@
               <a:buChar char="•"/>
             </a:pPr>
             <a:r>
-              <a:rPr lang="en-US" sz="1800" b="1" strike="noStrike" spc="49" dirty="0">
+              <a:rPr lang="en-US" b="1" strike="noStrike" spc="49" dirty="0">
                 <a:solidFill>
                   <a:srgbClr val="000000"/>
                 </a:solidFill>
@@ -18270,7 +18277,7 @@
               <a:t>GitHub Pages: </a:t>
             </a:r>
             <a:r>
-              <a:rPr lang="en-US" sz="1800" b="0" strike="noStrike" spc="49" dirty="0">
+              <a:rPr lang="en-US" b="0" strike="noStrike" spc="49" dirty="0">
                 <a:solidFill>
                   <a:srgbClr val="000000"/>
                 </a:solidFill>
@@ -18279,7 +18286,7 @@
               <a:t>A static site hosting service (website)-</a:t>
             </a:r>
             <a:r>
-              <a:rPr lang="en-US" sz="1800" b="1" strike="noStrike" spc="49" dirty="0">
+              <a:rPr lang="en-US" b="1" strike="noStrike" spc="49" dirty="0">
                 <a:solidFill>
                   <a:srgbClr val="000000"/>
                 </a:solidFill>
@@ -18287,7 +18294,7 @@
               </a:rPr>
               <a:t>Covered Next Session</a:t>
             </a:r>
-            <a:endParaRPr lang="en-US" sz="1800" b="0" strike="noStrike" spc="-1" dirty="0">
+            <a:endParaRPr lang="en-US" b="0" strike="noStrike" spc="-1" dirty="0">
               <a:solidFill>
                 <a:srgbClr val="000000"/>
               </a:solidFill>
@@ -18304,7 +18311,7 @@
               </a:spcBef>
               <a:buNone/>
             </a:pPr>
-            <a:endParaRPr lang="en-US" sz="1800" b="0" strike="noStrike" spc="-1" dirty="0">
+            <a:endParaRPr lang="en-US" sz="2400" b="0" strike="noStrike" spc="-1" dirty="0">
               <a:solidFill>
                 <a:srgbClr val="000000"/>
               </a:solidFill>
@@ -18497,7 +18504,7 @@
               </a:tabLst>
             </a:pPr>
             <a:r>
-              <a:rPr lang="en-US" sz="1800" b="1" strike="noStrike" spc="49">
+              <a:rPr lang="en-US" sz="2400" b="1" strike="noStrike" spc="49" dirty="0">
                 <a:solidFill>
                   <a:srgbClr val="000000"/>
                 </a:solidFill>
@@ -18505,7 +18512,7 @@
               </a:rPr>
               <a:t>A file of files</a:t>
             </a:r>
-            <a:endParaRPr lang="en-US" sz="1800" b="0" strike="noStrike" spc="-1">
+            <a:endParaRPr lang="en-US" sz="2400" b="0" strike="noStrike" spc="-1" dirty="0">
               <a:solidFill>
                 <a:srgbClr val="000000"/>
               </a:solidFill>
@@ -18530,7 +18537,7 @@
               </a:tabLst>
             </a:pPr>
             <a:r>
-              <a:rPr lang="en-US" sz="1800" b="0" strike="noStrike" spc="49">
+              <a:rPr lang="en-US" b="0" strike="noStrike" spc="49" dirty="0">
                 <a:solidFill>
                   <a:srgbClr val="000000"/>
                 </a:solidFill>
@@ -18539,7 +18546,7 @@
               </a:rPr>
               <a:t>Location where items are stored</a:t>
             </a:r>
-            <a:endParaRPr lang="en-US" sz="1800" b="0" strike="noStrike" spc="-1">
+            <a:endParaRPr lang="en-US" b="0" strike="noStrike" spc="-1" dirty="0">
               <a:solidFill>
                 <a:srgbClr val="000000"/>
               </a:solidFill>
@@ -18564,7 +18571,7 @@
               </a:tabLst>
             </a:pPr>
             <a:r>
-              <a:rPr lang="en-US" sz="1800" b="0" strike="noStrike" spc="49">
+              <a:rPr lang="en-US" b="0" strike="noStrike" spc="49" dirty="0">
                 <a:solidFill>
                   <a:srgbClr val="000000"/>
                 </a:solidFill>
@@ -18573,7 +18580,7 @@
               </a:rPr>
               <a:t>This can be on: </a:t>
             </a:r>
-            <a:endParaRPr lang="en-US" sz="1800" b="0" strike="noStrike" spc="-1">
+            <a:endParaRPr lang="en-US" b="0" strike="noStrike" spc="-1" dirty="0">
               <a:solidFill>
                 <a:srgbClr val="000000"/>
               </a:solidFill>
@@ -18598,7 +18605,7 @@
               </a:tabLst>
             </a:pPr>
             <a:r>
-              <a:rPr lang="en-US" sz="1800" b="0" strike="noStrike" spc="49">
+              <a:rPr lang="en-US" sz="2400" b="0" strike="noStrike" spc="49" dirty="0">
                 <a:solidFill>
                   <a:srgbClr val="000000"/>
                 </a:solidFill>
@@ -18607,7 +18614,7 @@
               </a:rPr>
               <a:t>Your personal computer</a:t>
             </a:r>
-            <a:endParaRPr lang="en-US" sz="1800" b="0" strike="noStrike" spc="-1">
+            <a:endParaRPr lang="en-US" sz="2400" b="0" strike="noStrike" spc="-1" dirty="0">
               <a:solidFill>
                 <a:srgbClr val="000000"/>
               </a:solidFill>
@@ -18632,7 +18639,7 @@
               </a:tabLst>
             </a:pPr>
             <a:r>
-              <a:rPr lang="en-US" sz="1800" b="0" strike="noStrike" spc="49">
+              <a:rPr lang="en-US" sz="2400" b="0" strike="noStrike" spc="49" dirty="0">
                 <a:solidFill>
                   <a:srgbClr val="000000"/>
                 </a:solidFill>
@@ -18641,7 +18648,7 @@
               </a:rPr>
               <a:t>Remote location </a:t>
             </a:r>
-            <a:endParaRPr lang="en-US" sz="1800" b="0" strike="noStrike" spc="-1">
+            <a:endParaRPr lang="en-US" sz="2400" b="0" strike="noStrike" spc="-1" dirty="0">
               <a:solidFill>
                 <a:srgbClr val="000000"/>
               </a:solidFill>
@@ -18666,7 +18673,7 @@
               </a:tabLst>
             </a:pPr>
             <a:r>
-              <a:rPr lang="en-US" sz="1800" b="0" strike="noStrike" spc="49">
+              <a:rPr lang="en-US" sz="2400" b="0" strike="noStrike" spc="49" dirty="0">
                 <a:solidFill>
                   <a:srgbClr val="000000"/>
                 </a:solidFill>
@@ -18675,7 +18682,7 @@
               </a:rPr>
               <a:t>Both</a:t>
             </a:r>
-            <a:endParaRPr lang="en-US" sz="1800" b="0" strike="noStrike" spc="-1">
+            <a:endParaRPr lang="en-US" sz="2400" b="0" strike="noStrike" spc="-1" dirty="0">
               <a:solidFill>
                 <a:srgbClr val="000000"/>
               </a:solidFill>
@@ -27423,7 +27430,7 @@
         <p:spPr>
           <a:xfrm>
             <a:off x="1322280" y="268200"/>
-            <a:ext cx="7287840" cy="2120760"/>
+            <a:ext cx="7287840" cy="1234923"/>
           </a:xfrm>
           <a:prstGeom prst="rect">
             <a:avLst/>
@@ -27542,8 +27549,8 @@
         </p:nvSpPr>
         <p:spPr>
           <a:xfrm>
-            <a:off x="1355411" y="2769627"/>
-            <a:ext cx="9882431" cy="3710685"/>
+            <a:off x="1355411" y="1866378"/>
+            <a:ext cx="9882431" cy="4854822"/>
           </a:xfrm>
           <a:prstGeom prst="rect">
             <a:avLst/>
@@ -27555,7 +27562,7 @@
         </p:spPr>
         <p:txBody>
           <a:bodyPr anchor="t">
-            <a:normAutofit/>
+            <a:normAutofit fontScale="92500" lnSpcReduction="10000"/>
           </a:bodyPr>
           <a:lstStyle>
             <a:lvl1pPr marL="228600" indent="-228600" algn="l" defTabSz="914400" rtl="0" eaLnBrk="1" latinLnBrk="0" hangingPunct="1">
@@ -27728,7 +27735,7 @@
               </a:spcBef>
             </a:pPr>
             <a:r>
-              <a:rPr lang="en-US" sz="2000" b="1" dirty="0">
+              <a:rPr lang="en-US" sz="3200" b="1" dirty="0">
                 <a:solidFill>
                   <a:srgbClr val="0E0E0E"/>
                 </a:solidFill>
@@ -27737,7 +27744,7 @@
               </a:rPr>
               <a:t>Visibility Options:</a:t>
             </a:r>
-            <a:endParaRPr lang="en-US" sz="2000" dirty="0">
+            <a:endParaRPr lang="en-US" sz="3200" dirty="0">
               <a:solidFill>
                 <a:srgbClr val="0E0E0E"/>
               </a:solidFill>
@@ -27752,7 +27759,7 @@
               </a:spcBef>
             </a:pPr>
             <a:r>
-              <a:rPr lang="en-US" sz="1600" b="1" dirty="0">
+              <a:rPr lang="en-US" b="1" dirty="0">
                 <a:solidFill>
                   <a:srgbClr val="0E0E0E"/>
                 </a:solidFill>
@@ -27762,7 +27769,7 @@
               <a:t>Public:</a:t>
             </a:r>
             <a:r>
-              <a:rPr lang="en-US" sz="1600" dirty="0">
+              <a:rPr lang="en-US" dirty="0">
                 <a:solidFill>
                   <a:srgbClr val="0E0E0E"/>
                 </a:solidFill>
@@ -27779,7 +27786,7 @@
               </a:spcBef>
             </a:pPr>
             <a:r>
-              <a:rPr lang="en-US" sz="1600" b="1" dirty="0">
+              <a:rPr lang="en-US" b="1" dirty="0">
                 <a:solidFill>
                   <a:srgbClr val="0E0E0E"/>
                 </a:solidFill>
@@ -27789,7 +27796,7 @@
               <a:t>Private:</a:t>
             </a:r>
             <a:r>
-              <a:rPr lang="en-US" sz="1600" dirty="0">
+              <a:rPr lang="en-US" dirty="0">
                 <a:solidFill>
                   <a:srgbClr val="0E0E0E"/>
                 </a:solidFill>
@@ -27806,7 +27813,7 @@
               </a:spcBef>
             </a:pPr>
             <a:r>
-              <a:rPr lang="en-US" sz="2000" b="1" dirty="0">
+              <a:rPr lang="en-US" sz="3200" b="1" dirty="0">
                 <a:solidFill>
                   <a:srgbClr val="0E0E0E"/>
                 </a:solidFill>
@@ -27816,7 +27823,7 @@
               <a:t>Initialize: </a:t>
             </a:r>
             <a:r>
-              <a:rPr lang="en-US" sz="2000" dirty="0">
+              <a:rPr lang="en-US" sz="3200" dirty="0">
                 <a:solidFill>
                   <a:srgbClr val="0E0E0E"/>
                 </a:solidFill>
@@ -27825,7 +27832,7 @@
               </a:rPr>
               <a:t>Initializing a repository means setting up a new project folder (repository) for Git to start tracking changes. You can do this on your local computer or when setting up your repository online by adding selected files:</a:t>
             </a:r>
-            <a:endParaRPr lang="en-US" sz="2000" b="1" dirty="0">
+            <a:endParaRPr lang="en-US" sz="3200" b="1" dirty="0">
               <a:solidFill>
                 <a:srgbClr val="0E0E0E"/>
               </a:solidFill>
@@ -27839,7 +27846,7 @@
               </a:spcBef>
             </a:pPr>
             <a:r>
-              <a:rPr lang="en-US" sz="1600" b="1" dirty="0">
+              <a:rPr lang="en-US" b="1" dirty="0">
                 <a:solidFill>
                   <a:srgbClr val="0E0E0E"/>
                 </a:solidFill>
@@ -27848,7 +27855,7 @@
               <a:t>Add a</a:t>
             </a:r>
             <a:r>
-              <a:rPr lang="en-US" sz="1600" b="1" dirty="0">
+              <a:rPr lang="en-US" b="1" dirty="0">
                 <a:solidFill>
                   <a:srgbClr val="0E0E0E"/>
                 </a:solidFill>
@@ -27858,7 +27865,7 @@
               <a:t> README:</a:t>
             </a:r>
             <a:r>
-              <a:rPr lang="en-US" sz="1600" dirty="0">
+              <a:rPr lang="en-US" dirty="0">
                 <a:solidFill>
                   <a:srgbClr val="0E0E0E"/>
                 </a:solidFill>
@@ -27868,7 +27875,7 @@
               <a:t> Automatically adds a </a:t>
             </a:r>
             <a:r>
-              <a:rPr lang="en-US" sz="1600" dirty="0" err="1">
+              <a:rPr lang="en-US" dirty="0" err="1">
                 <a:solidFill>
                   <a:srgbClr val="0E0E0E"/>
                 </a:solidFill>
@@ -27878,7 +27885,7 @@
               <a:t>README.md</a:t>
             </a:r>
             <a:r>
-              <a:rPr lang="en-US" sz="1600" dirty="0">
+              <a:rPr lang="en-US" dirty="0">
                 <a:solidFill>
                   <a:srgbClr val="0E0E0E"/>
                 </a:solidFill>
@@ -27895,7 +27902,7 @@
               </a:spcBef>
             </a:pPr>
             <a:r>
-              <a:rPr lang="en-US" sz="1600" b="1" dirty="0">
+              <a:rPr lang="en-US" b="1" dirty="0">
                 <a:solidFill>
                   <a:srgbClr val="0E0E0E"/>
                 </a:solidFill>
@@ -27905,7 +27912,7 @@
               <a:t>Add a .</a:t>
             </a:r>
             <a:r>
-              <a:rPr lang="en-US" sz="1600" b="1" dirty="0" err="1">
+              <a:rPr lang="en-US" b="1" dirty="0" err="1">
                 <a:solidFill>
                   <a:srgbClr val="0E0E0E"/>
                 </a:solidFill>
@@ -27915,7 +27922,7 @@
               <a:t>gitignore</a:t>
             </a:r>
             <a:r>
-              <a:rPr lang="en-US" sz="1600" b="1" dirty="0">
+              <a:rPr lang="en-US" b="1" dirty="0">
                 <a:solidFill>
                   <a:srgbClr val="0E0E0E"/>
                 </a:solidFill>
@@ -27925,7 +27932,7 @@
               <a:t> File:</a:t>
             </a:r>
             <a:r>
-              <a:rPr lang="en-US" sz="1600" dirty="0">
+              <a:rPr lang="en-US" dirty="0">
                 <a:solidFill>
                   <a:srgbClr val="0E0E0E"/>
                 </a:solidFill>
@@ -27942,7 +27949,7 @@
               </a:spcBef>
             </a:pPr>
             <a:r>
-              <a:rPr lang="en-US" sz="1600" b="1" dirty="0">
+              <a:rPr lang="en-US" b="1" dirty="0">
                 <a:solidFill>
                   <a:srgbClr val="0E0E0E"/>
                 </a:solidFill>
@@ -27952,7 +27959,7 @@
               <a:t>Add a License:</a:t>
             </a:r>
             <a:r>
-              <a:rPr lang="en-US" sz="1600" dirty="0">
+              <a:rPr lang="en-US" dirty="0">
                 <a:solidFill>
                   <a:srgbClr val="0E0E0E"/>
                 </a:solidFill>
@@ -28014,7 +28021,7 @@
         <p:spPr>
           <a:xfrm>
             <a:off x="803385" y="-477360"/>
-            <a:ext cx="7287840" cy="2120760"/>
+            <a:ext cx="7287840" cy="1479960"/>
           </a:xfrm>
           <a:prstGeom prst="rect">
             <a:avLst/>
@@ -28056,228 +28063,6 @@
       </p:sp>
       <p:sp>
         <p:nvSpPr>
-          <p:cNvPr id="414" name="PlaceHolder 2">
-            <a:extLst>
-              <a:ext uri="{FF2B5EF4-FFF2-40B4-BE49-F238E27FC236}">
-                <a16:creationId xmlns:a16="http://schemas.microsoft.com/office/drawing/2014/main" id="{1E4E4F98-9014-419D-55D0-1B8ECC8D103B}"/>
-              </a:ext>
-            </a:extLst>
-          </p:cNvPr>
-          <p:cNvSpPr>
-            <a:spLocks noGrp="1"/>
-          </p:cNvSpPr>
-          <p:nvPr>
-            <p:ph/>
-          </p:nvPr>
-        </p:nvSpPr>
-        <p:spPr>
-          <a:xfrm>
-            <a:off x="434385" y="2388960"/>
-            <a:ext cx="4012920" cy="4332240"/>
-          </a:xfrm>
-          <a:prstGeom prst="rect">
-            <a:avLst/>
-          </a:prstGeom>
-          <a:noFill/>
-          <a:ln w="0">
-            <a:noFill/>
-          </a:ln>
-        </p:spPr>
-        <p:txBody>
-          <a:bodyPr anchor="t">
-            <a:normAutofit/>
-          </a:bodyPr>
-          <a:lstStyle/>
-          <a:p>
-            <a:pPr marL="280440" lvl="2" indent="0">
-              <a:lnSpc>
-                <a:spcPct val="100000"/>
-              </a:lnSpc>
-              <a:spcBef>
-                <a:spcPts val="1001"/>
-              </a:spcBef>
-              <a:buClr>
-                <a:srgbClr val="000000"/>
-              </a:buClr>
-              <a:buNone/>
-            </a:pPr>
-            <a:r>
-              <a:rPr lang="en-US" b="1" strike="noStrike" spc="49" dirty="0" err="1">
-                <a:solidFill>
-                  <a:srgbClr val="000000"/>
-                </a:solidFill>
-                <a:latin typeface="Tenorite" pitchFamily="2" charset="0"/>
-                <a:ea typeface="Tenorite"/>
-              </a:rPr>
-              <a:t>README.md</a:t>
-            </a:r>
-            <a:endParaRPr lang="en-US" b="1" strike="noStrike" spc="49" dirty="0">
-              <a:solidFill>
-                <a:srgbClr val="000000"/>
-              </a:solidFill>
-              <a:latin typeface="Tenorite" pitchFamily="2" charset="0"/>
-              <a:ea typeface="Tenorite"/>
-            </a:endParaRPr>
-          </a:p>
-          <a:p>
-            <a:r>
-              <a:rPr lang="en-US" sz="1800" b="1" dirty="0">
-                <a:solidFill>
-                  <a:srgbClr val="0E0E0E"/>
-                </a:solidFill>
-                <a:effectLst/>
-                <a:latin typeface="Tenorite" pitchFamily="2" charset="0"/>
-              </a:rPr>
-              <a:t>Purpose: </a:t>
-            </a:r>
-            <a:r>
-              <a:rPr lang="en-US" sz="1800" dirty="0">
-                <a:solidFill>
-                  <a:srgbClr val="0E0E0E"/>
-                </a:solidFill>
-                <a:effectLst/>
-                <a:latin typeface="Tenorite" pitchFamily="2" charset="0"/>
-              </a:rPr>
-              <a:t>Provides a description of the repository and its purpose.</a:t>
-            </a:r>
-          </a:p>
-          <a:p>
-            <a:pPr>
-              <a:spcBef>
-                <a:spcPts val="900"/>
-              </a:spcBef>
-            </a:pPr>
-            <a:r>
-              <a:rPr lang="en-US" sz="1800" b="1" dirty="0">
-                <a:solidFill>
-                  <a:srgbClr val="0E0E0E"/>
-                </a:solidFill>
-                <a:effectLst/>
-                <a:latin typeface="Tenorite" pitchFamily="2" charset="0"/>
-              </a:rPr>
-              <a:t>Why It’s Important: </a:t>
-            </a:r>
-            <a:r>
-              <a:rPr lang="en-US" sz="1800" dirty="0">
-                <a:solidFill>
-                  <a:srgbClr val="0E0E0E"/>
-                </a:solidFill>
-                <a:effectLst/>
-                <a:latin typeface="Tenorite" pitchFamily="2" charset="0"/>
-              </a:rPr>
-              <a:t>Helps others (and you!) understand what the project is about and how to use it.</a:t>
-            </a:r>
-          </a:p>
-          <a:p>
-            <a:pPr>
-              <a:spcBef>
-                <a:spcPts val="900"/>
-              </a:spcBef>
-            </a:pPr>
-            <a:r>
-              <a:rPr lang="en-US" sz="1800" b="1" dirty="0">
-                <a:solidFill>
-                  <a:srgbClr val="0E0E0E"/>
-                </a:solidFill>
-                <a:effectLst/>
-                <a:latin typeface="Tenorite" pitchFamily="2" charset="0"/>
-              </a:rPr>
-              <a:t>What to Include:</a:t>
-            </a:r>
-          </a:p>
-          <a:p>
-            <a:pPr lvl="1">
-              <a:spcBef>
-                <a:spcPts val="900"/>
-              </a:spcBef>
-            </a:pPr>
-            <a:r>
-              <a:rPr lang="en-US" sz="1800" dirty="0">
-                <a:solidFill>
-                  <a:srgbClr val="0E0E0E"/>
-                </a:solidFill>
-                <a:effectLst/>
-                <a:latin typeface="Tenorite" pitchFamily="2" charset="0"/>
-              </a:rPr>
-              <a:t>Project title and description.</a:t>
-            </a:r>
-          </a:p>
-          <a:p>
-            <a:pPr lvl="1">
-              <a:spcBef>
-                <a:spcPts val="900"/>
-              </a:spcBef>
-            </a:pPr>
-            <a:r>
-              <a:rPr lang="en-US" sz="1800" dirty="0">
-                <a:solidFill>
-                  <a:srgbClr val="0E0E0E"/>
-                </a:solidFill>
-                <a:effectLst/>
-                <a:latin typeface="Tenorite" pitchFamily="2" charset="0"/>
-              </a:rPr>
-              <a:t>Installation instructions.</a:t>
-            </a:r>
-          </a:p>
-          <a:p>
-            <a:pPr lvl="1">
-              <a:spcBef>
-                <a:spcPts val="900"/>
-              </a:spcBef>
-            </a:pPr>
-            <a:r>
-              <a:rPr lang="en-US" sz="1800" dirty="0">
-                <a:solidFill>
-                  <a:srgbClr val="0E0E0E"/>
-                </a:solidFill>
-                <a:effectLst/>
-                <a:latin typeface="Tenorite" pitchFamily="2" charset="0"/>
-              </a:rPr>
-              <a:t>Usage examples.</a:t>
-            </a:r>
-          </a:p>
-          <a:p>
-            <a:pPr lvl="1">
-              <a:spcBef>
-                <a:spcPts val="900"/>
-              </a:spcBef>
-            </a:pPr>
-            <a:r>
-              <a:rPr lang="en-US" sz="1800" dirty="0">
-                <a:solidFill>
-                  <a:srgbClr val="0E0E0E"/>
-                </a:solidFill>
-                <a:effectLst/>
-                <a:latin typeface="Tenorite" pitchFamily="2" charset="0"/>
-              </a:rPr>
-              <a:t>Contact information or links.</a:t>
-            </a:r>
-          </a:p>
-          <a:p>
-            <a:pPr marL="280440" lvl="2" indent="0">
-              <a:lnSpc>
-                <a:spcPct val="100000"/>
-              </a:lnSpc>
-              <a:spcBef>
-                <a:spcPts val="1001"/>
-              </a:spcBef>
-              <a:buClr>
-                <a:srgbClr val="000000"/>
-              </a:buClr>
-              <a:buNone/>
-            </a:pPr>
-            <a:endParaRPr lang="en-US" sz="1800" strike="noStrike" spc="49" dirty="0">
-              <a:solidFill>
-                <a:srgbClr val="000000"/>
-              </a:solidFill>
-              <a:latin typeface="Tenorite" pitchFamily="2" charset="0"/>
-              <a:ea typeface="Tenorite"/>
-            </a:endParaRPr>
-          </a:p>
-        </p:txBody>
-      </p:sp>
-      <p:sp>
-        <p:nvSpPr>
           <p:cNvPr id="415" name="PlaceHolder 3">
             <a:extLst>
               <a:ext uri="{FF2B5EF4-FFF2-40B4-BE49-F238E27FC236}">
@@ -28363,8 +28148,8 @@
         </p:blipFill>
         <p:spPr>
           <a:xfrm>
-            <a:off x="4348440" y="897840"/>
-            <a:ext cx="7772040" cy="4817880"/>
+            <a:off x="0" y="0"/>
+            <a:ext cx="10094070" cy="6141787"/>
           </a:xfrm>
           <a:prstGeom prst="rect">
             <a:avLst/>
@@ -28374,6 +28159,239 @@
           </a:ln>
         </p:spPr>
       </p:pic>
+      <p:sp>
+        <p:nvSpPr>
+          <p:cNvPr id="414" name="PlaceHolder 2">
+            <a:extLst>
+              <a:ext uri="{FF2B5EF4-FFF2-40B4-BE49-F238E27FC236}">
+                <a16:creationId xmlns:a16="http://schemas.microsoft.com/office/drawing/2014/main" id="{1E4E4F98-9014-419D-55D0-1B8ECC8D103B}"/>
+              </a:ext>
+            </a:extLst>
+          </p:cNvPr>
+          <p:cNvSpPr>
+            <a:spLocks noGrp="1"/>
+          </p:cNvSpPr>
+          <p:nvPr>
+            <p:ph/>
+          </p:nvPr>
+        </p:nvSpPr>
+        <p:spPr>
+          <a:xfrm>
+            <a:off x="7404101" y="2463800"/>
+            <a:ext cx="4787900" cy="4394200"/>
+          </a:xfrm>
+          <a:prstGeom prst="rect">
+            <a:avLst/>
+          </a:prstGeom>
+          <a:ln/>
+        </p:spPr>
+        <p:style>
+          <a:lnRef idx="2">
+            <a:schemeClr val="dk1"/>
+          </a:lnRef>
+          <a:fillRef idx="1">
+            <a:schemeClr val="lt1"/>
+          </a:fillRef>
+          <a:effectRef idx="0">
+            <a:schemeClr val="dk1"/>
+          </a:effectRef>
+          <a:fontRef idx="minor">
+            <a:schemeClr val="dk1"/>
+          </a:fontRef>
+        </p:style>
+        <p:txBody>
+          <a:bodyPr anchor="t">
+            <a:normAutofit fontScale="92500"/>
+          </a:bodyPr>
+          <a:lstStyle/>
+          <a:p>
+            <a:pPr marL="280440" lvl="2" indent="0">
+              <a:lnSpc>
+                <a:spcPct val="100000"/>
+              </a:lnSpc>
+              <a:spcBef>
+                <a:spcPts val="1001"/>
+              </a:spcBef>
+              <a:buClr>
+                <a:srgbClr val="000000"/>
+              </a:buClr>
+              <a:buNone/>
+            </a:pPr>
+            <a:r>
+              <a:rPr lang="en-US" sz="2800" b="1" strike="noStrike" spc="49" dirty="0" err="1">
+                <a:solidFill>
+                  <a:srgbClr val="000000"/>
+                </a:solidFill>
+                <a:latin typeface="Tenorite" pitchFamily="2" charset="0"/>
+                <a:ea typeface="Tenorite"/>
+              </a:rPr>
+              <a:t>README.md</a:t>
+            </a:r>
+            <a:endParaRPr lang="en-US" sz="2800" b="1" strike="noStrike" spc="49" dirty="0">
+              <a:solidFill>
+                <a:srgbClr val="000000"/>
+              </a:solidFill>
+              <a:latin typeface="Tenorite" pitchFamily="2" charset="0"/>
+              <a:ea typeface="Tenorite"/>
+            </a:endParaRPr>
+          </a:p>
+          <a:p>
+            <a:r>
+              <a:rPr lang="en-US" sz="2400" b="1" dirty="0">
+                <a:solidFill>
+                  <a:srgbClr val="0E0E0E"/>
+                </a:solidFill>
+                <a:effectLst/>
+                <a:latin typeface="Tenorite" pitchFamily="2" charset="0"/>
+              </a:rPr>
+              <a:t>Purpose: </a:t>
+            </a:r>
+            <a:r>
+              <a:rPr lang="en-US" sz="2400" dirty="0">
+                <a:solidFill>
+                  <a:srgbClr val="0E0E0E"/>
+                </a:solidFill>
+                <a:effectLst/>
+                <a:latin typeface="Tenorite" pitchFamily="2" charset="0"/>
+              </a:rPr>
+              <a:t>Provides a description of the repository and its purpose.</a:t>
+            </a:r>
+          </a:p>
+          <a:p>
+            <a:pPr>
+              <a:spcBef>
+                <a:spcPts val="900"/>
+              </a:spcBef>
+            </a:pPr>
+            <a:r>
+              <a:rPr lang="en-US" sz="2400" b="1" dirty="0">
+                <a:solidFill>
+                  <a:srgbClr val="0E0E0E"/>
+                </a:solidFill>
+                <a:effectLst/>
+                <a:latin typeface="Tenorite" pitchFamily="2" charset="0"/>
+              </a:rPr>
+              <a:t>Why It’s Important: </a:t>
+            </a:r>
+            <a:r>
+              <a:rPr lang="en-US" sz="2400" dirty="0">
+                <a:solidFill>
+                  <a:srgbClr val="0E0E0E"/>
+                </a:solidFill>
+                <a:effectLst/>
+                <a:latin typeface="Tenorite" pitchFamily="2" charset="0"/>
+              </a:rPr>
+              <a:t>Helps others (and you!) understand what the project is about and how to use it.</a:t>
+            </a:r>
+          </a:p>
+          <a:p>
+            <a:pPr>
+              <a:spcBef>
+                <a:spcPts val="900"/>
+              </a:spcBef>
+            </a:pPr>
+            <a:r>
+              <a:rPr lang="en-US" sz="2400" b="1" dirty="0">
+                <a:solidFill>
+                  <a:srgbClr val="0E0E0E"/>
+                </a:solidFill>
+                <a:effectLst/>
+                <a:latin typeface="Tenorite" pitchFamily="2" charset="0"/>
+              </a:rPr>
+              <a:t>What to Include:</a:t>
+            </a:r>
+          </a:p>
+          <a:p>
+            <a:pPr lvl="1">
+              <a:spcBef>
+                <a:spcPts val="900"/>
+              </a:spcBef>
+            </a:pPr>
+            <a:r>
+              <a:rPr lang="en-US" dirty="0">
+                <a:solidFill>
+                  <a:srgbClr val="0E0E0E"/>
+                </a:solidFill>
+                <a:effectLst/>
+                <a:latin typeface="Tenorite" pitchFamily="2" charset="0"/>
+              </a:rPr>
+              <a:t>Project title and description.</a:t>
+            </a:r>
+          </a:p>
+          <a:p>
+            <a:pPr lvl="1">
+              <a:spcBef>
+                <a:spcPts val="900"/>
+              </a:spcBef>
+            </a:pPr>
+            <a:r>
+              <a:rPr lang="en-US" dirty="0">
+                <a:solidFill>
+                  <a:srgbClr val="0E0E0E"/>
+                </a:solidFill>
+                <a:effectLst/>
+                <a:latin typeface="Tenorite" pitchFamily="2" charset="0"/>
+              </a:rPr>
+              <a:t>Installation instructions.</a:t>
+            </a:r>
+          </a:p>
+          <a:p>
+            <a:pPr lvl="1">
+              <a:spcBef>
+                <a:spcPts val="900"/>
+              </a:spcBef>
+            </a:pPr>
+            <a:r>
+              <a:rPr lang="en-US" dirty="0">
+                <a:solidFill>
+                  <a:srgbClr val="0E0E0E"/>
+                </a:solidFill>
+                <a:effectLst/>
+                <a:latin typeface="Tenorite" pitchFamily="2" charset="0"/>
+              </a:rPr>
+              <a:t>Usage examples.</a:t>
+            </a:r>
+          </a:p>
+          <a:p>
+            <a:pPr lvl="1">
+              <a:spcBef>
+                <a:spcPts val="900"/>
+              </a:spcBef>
+            </a:pPr>
+            <a:r>
+              <a:rPr lang="en-US" dirty="0">
+                <a:solidFill>
+                  <a:srgbClr val="0E0E0E"/>
+                </a:solidFill>
+                <a:effectLst/>
+                <a:latin typeface="Tenorite" pitchFamily="2" charset="0"/>
+              </a:rPr>
+              <a:t>Contact information or links.</a:t>
+            </a:r>
+          </a:p>
+          <a:p>
+            <a:pPr marL="280440" lvl="2" indent="0">
+              <a:lnSpc>
+                <a:spcPct val="100000"/>
+              </a:lnSpc>
+              <a:spcBef>
+                <a:spcPts val="1001"/>
+              </a:spcBef>
+              <a:buClr>
+                <a:srgbClr val="000000"/>
+              </a:buClr>
+              <a:buNone/>
+            </a:pPr>
+            <a:endParaRPr lang="en-US" sz="2400" strike="noStrike" spc="49" dirty="0">
+              <a:solidFill>
+                <a:srgbClr val="000000"/>
+              </a:solidFill>
+              <a:latin typeface="Tenorite" pitchFamily="2" charset="0"/>
+              <a:ea typeface="Tenorite"/>
+            </a:endParaRPr>
+          </a:p>
+        </p:txBody>
+      </p:sp>
     </p:spTree>
     <p:extLst>
       <p:ext uri="{BB962C8B-B14F-4D97-AF65-F5344CB8AC3E}">
@@ -28417,7 +28435,7 @@
         <p:spPr>
           <a:xfrm>
             <a:off x="1322280" y="268200"/>
-            <a:ext cx="7287840" cy="2120760"/>
+            <a:ext cx="7287840" cy="884195"/>
           </a:xfrm>
           <a:prstGeom prst="rect">
             <a:avLst/>
@@ -28440,7 +28458,7 @@
               <a:buNone/>
             </a:pPr>
             <a:r>
-              <a:rPr lang="en-US" sz="2800" b="0" strike="noStrike" cap="all" spc="148">
+              <a:rPr lang="en-US" sz="2800" b="0" strike="noStrike" cap="all" spc="148" dirty="0">
                 <a:solidFill>
                   <a:srgbClr val="000000"/>
                 </a:solidFill>
@@ -28448,7 +28466,7 @@
               </a:rPr>
               <a:t>GitHub</a:t>
             </a:r>
-            <a:endParaRPr lang="en-US" sz="2800" b="0" strike="noStrike" spc="-1">
+            <a:endParaRPr lang="en-US" sz="2800" b="0" strike="noStrike" spc="-1" dirty="0">
               <a:solidFill>
                 <a:srgbClr val="000000"/>
               </a:solidFill>
@@ -28469,8 +28487,8 @@
         </p:nvSpPr>
         <p:spPr>
           <a:xfrm>
-            <a:off x="1322280" y="2763000"/>
-            <a:ext cx="4012920" cy="3958200"/>
+            <a:off x="400833" y="1540701"/>
+            <a:ext cx="4934367" cy="5180499"/>
           </a:xfrm>
           <a:prstGeom prst="rect">
             <a:avLst/>
@@ -28482,7 +28500,7 @@
         </p:spPr>
         <p:txBody>
           <a:bodyPr anchor="t">
-            <a:normAutofit fontScale="70000" lnSpcReduction="20000"/>
+            <a:normAutofit fontScale="92500" lnSpcReduction="10000"/>
           </a:bodyPr>
           <a:lstStyle/>
           <a:p>
@@ -28809,8 +28827,8 @@
         </p:blipFill>
         <p:spPr>
           <a:xfrm>
-            <a:off x="5605560" y="2028240"/>
-            <a:ext cx="4764600" cy="2200320"/>
+            <a:off x="5694460" y="1540701"/>
+            <a:ext cx="6497540" cy="2975560"/>
           </a:xfrm>
           <a:prstGeom prst="rect">
             <a:avLst/>
@@ -28858,7 +28876,7 @@
         <p:spPr>
           <a:xfrm>
             <a:off x="1322280" y="268200"/>
-            <a:ext cx="7287840" cy="2120760"/>
+            <a:ext cx="7287840" cy="883800"/>
           </a:xfrm>
           <a:prstGeom prst="rect">
             <a:avLst/>
@@ -28881,7 +28899,7 @@
               <a:buNone/>
             </a:pPr>
             <a:r>
-              <a:rPr lang="en-US" sz="2800" b="0" strike="noStrike" cap="all" spc="148">
+              <a:rPr lang="en-US" sz="2800" b="0" strike="noStrike" cap="all" spc="148" dirty="0">
                 <a:solidFill>
                   <a:srgbClr val="000000"/>
                 </a:solidFill>
@@ -28889,7 +28907,7 @@
               </a:rPr>
               <a:t>GitHub</a:t>
             </a:r>
-            <a:endParaRPr lang="en-US" sz="2800" b="0" strike="noStrike" spc="-1">
+            <a:endParaRPr lang="en-US" sz="2800" b="0" strike="noStrike" spc="-1" dirty="0">
               <a:solidFill>
                 <a:srgbClr val="000000"/>
               </a:solidFill>
@@ -28910,8 +28928,8 @@
         </p:nvSpPr>
         <p:spPr>
           <a:xfrm>
-            <a:off x="945240" y="2763000"/>
-            <a:ext cx="3667440" cy="3593520"/>
+            <a:off x="501041" y="1802520"/>
+            <a:ext cx="4111639" cy="4554000"/>
           </a:xfrm>
           <a:prstGeom prst="rect">
             <a:avLst/>
@@ -28940,7 +28958,7 @@
               <a:buNone/>
             </a:pPr>
             <a:r>
-              <a:rPr lang="en-US" b="1" strike="noStrike" spc="-1" dirty="0">
+              <a:rPr lang="en-US" sz="2800" b="1" strike="noStrike" spc="-1" dirty="0">
                 <a:solidFill>
                   <a:srgbClr val="000000"/>
                 </a:solidFill>
@@ -28962,7 +28980,7 @@
               </a:buClr>
               <a:buNone/>
             </a:pPr>
-            <a:endParaRPr lang="en-US" b="1" strike="noStrike" spc="-1" dirty="0">
+            <a:endParaRPr lang="en-US" sz="2800" b="1" strike="noStrike" spc="-1" dirty="0">
               <a:solidFill>
                 <a:srgbClr val="000000"/>
               </a:solidFill>
@@ -28971,7 +28989,7 @@
           </a:p>
           <a:p>
             <a:r>
-              <a:rPr lang="en-US" sz="1800" b="1" dirty="0">
+              <a:rPr lang="en-US" sz="2400" b="1" dirty="0">
                 <a:solidFill>
                   <a:srgbClr val="0E0E0E"/>
                 </a:solidFill>
@@ -28981,7 +28999,7 @@
               <a:t>Purpose:</a:t>
             </a:r>
             <a:r>
-              <a:rPr lang="en-US" sz="1800" dirty="0">
+              <a:rPr lang="en-US" sz="2400" dirty="0">
                 <a:solidFill>
                   <a:srgbClr val="0E0E0E"/>
                 </a:solidFill>
@@ -28998,7 +29016,7 @@
               </a:spcBef>
             </a:pPr>
             <a:r>
-              <a:rPr lang="en-US" sz="1800" b="1" dirty="0">
+              <a:rPr lang="en-US" sz="2400" b="1" dirty="0">
                 <a:solidFill>
                   <a:srgbClr val="0E0E0E"/>
                 </a:solidFill>
@@ -29008,7 +29026,7 @@
               <a:t>Why It’s Important:</a:t>
             </a:r>
             <a:r>
-              <a:rPr lang="en-US" sz="1800" dirty="0">
+              <a:rPr lang="en-US" sz="2400" dirty="0">
                 <a:solidFill>
                   <a:srgbClr val="0E0E0E"/>
                 </a:solidFill>
@@ -29031,7 +29049,7 @@
               </a:buClr>
               <a:buNone/>
             </a:pPr>
-            <a:endParaRPr lang="en-US" b="1" strike="noStrike" spc="-1" dirty="0">
+            <a:endParaRPr lang="en-US" sz="2800" b="1" strike="noStrike" spc="-1" dirty="0">
               <a:solidFill>
                 <a:srgbClr val="000000"/>
               </a:solidFill>
@@ -29116,7 +29134,7 @@
         <p:spPr>
           <a:xfrm>
             <a:off x="4612680" y="1152000"/>
-            <a:ext cx="6634080" cy="4554000"/>
+            <a:ext cx="7579320" cy="5299600"/>
           </a:xfrm>
           <a:prstGeom prst="rect">
             <a:avLst/>
@@ -29248,7 +29266,7 @@
         <p:spPr>
           <a:xfrm>
             <a:off x="3603927" y="0"/>
-            <a:ext cx="4179240" cy="1524240"/>
+            <a:ext cx="4179240" cy="914400"/>
           </a:xfrm>
         </p:spPr>
         <p:txBody>
@@ -29284,7 +29302,7 @@
         </p:blipFill>
         <p:spPr>
           <a:xfrm>
-            <a:off x="6776001" y="458817"/>
+            <a:off x="8905426" y="0"/>
             <a:ext cx="2933700" cy="635000"/>
           </a:xfrm>
           <a:prstGeom prst="rect">
@@ -29314,8 +29332,8 @@
         </p:blipFill>
         <p:spPr>
           <a:xfrm>
-            <a:off x="1658400" y="1093817"/>
-            <a:ext cx="8875199" cy="5764183"/>
+            <a:off x="0" y="914400"/>
+            <a:ext cx="12163550" cy="7899871"/>
           </a:xfrm>
           <a:prstGeom prst="rect">
             <a:avLst/>
@@ -29365,7 +29383,7 @@
         <p:spPr>
           <a:xfrm>
             <a:off x="1322280" y="268200"/>
-            <a:ext cx="7851960" cy="2120760"/>
+            <a:ext cx="7851960" cy="1059559"/>
           </a:xfrm>
           <a:prstGeom prst="rect">
             <a:avLst/>
@@ -29388,16 +29406,26 @@
               <a:buNone/>
             </a:pPr>
             <a:r>
-              <a:rPr lang="en-US" sz="2800" b="0" strike="noStrike" cap="all" spc="148">
+              <a:rPr lang="en-US" sz="2800" b="0" strike="noStrike" cap="all" spc="148" dirty="0" err="1">
                 <a:solidFill>
                   <a:srgbClr val="000000"/>
                 </a:solidFill>
                 <a:latin typeface="Tenorite"/>
                 <a:ea typeface="Tenorite"/>
               </a:rPr>
-              <a:t>Hands-ON: Create a GitHub Repository</a:t>
+              <a:t>Hands-ON</a:t>
             </a:r>
-            <a:endParaRPr lang="en-US" sz="2800" b="0" strike="noStrike" spc="-1">
+            <a:r>
+              <a:rPr lang="en-US" sz="2800" b="0" strike="noStrike" cap="all" spc="148" dirty="0">
+                <a:solidFill>
+                  <a:srgbClr val="000000"/>
+                </a:solidFill>
+                <a:latin typeface="Tenorite"/>
+                <a:ea typeface="Tenorite"/>
+              </a:rPr>
+              <a:t>: Create a GitHub Repository</a:t>
+            </a:r>
+            <a:endParaRPr lang="en-US" sz="2800" b="0" strike="noStrike" spc="-1" dirty="0">
               <a:solidFill>
                 <a:srgbClr val="000000"/>
               </a:solidFill>
@@ -29448,7 +29476,7 @@
               </a:tabLst>
             </a:pPr>
             <a:r>
-              <a:rPr lang="en-US" sz="1800" b="1" strike="noStrike" spc="49" dirty="0">
+              <a:rPr lang="en-US" sz="2400" b="1" strike="noStrike" spc="49" dirty="0">
                 <a:solidFill>
                   <a:srgbClr val="000000"/>
                 </a:solidFill>
@@ -29456,7 +29484,7 @@
               </a:rPr>
               <a:t>Test Repository</a:t>
             </a:r>
-            <a:endParaRPr lang="en-US" sz="1800" b="0" strike="noStrike" spc="-1" dirty="0">
+            <a:endParaRPr lang="en-US" sz="2400" b="0" strike="noStrike" spc="-1" dirty="0">
               <a:solidFill>
                 <a:srgbClr val="000000"/>
               </a:solidFill>
@@ -29481,7 +29509,7 @@
               </a:tabLst>
             </a:pPr>
             <a:r>
-              <a:rPr lang="en-US" sz="1800" b="0" strike="noStrike" spc="49" dirty="0">
+              <a:rPr lang="en-US" b="0" strike="noStrike" spc="49" dirty="0">
                 <a:solidFill>
                   <a:srgbClr val="000000"/>
                 </a:solidFill>
@@ -29490,7 +29518,7 @@
               </a:rPr>
               <a:t>Follow 1_setup.md in the Practice folder</a:t>
             </a:r>
-            <a:endParaRPr lang="en-US" sz="1800" b="0" strike="noStrike" spc="-1" dirty="0">
+            <a:endParaRPr lang="en-US" b="0" strike="noStrike" spc="-1" dirty="0">
               <a:solidFill>
                 <a:srgbClr val="000000"/>
               </a:solidFill>
@@ -29515,7 +29543,7 @@
               </a:tabLst>
             </a:pPr>
             <a:r>
-              <a:rPr lang="en-US" sz="1800" b="0" strike="noStrike" spc="49" dirty="0">
+              <a:rPr lang="en-US" b="0" strike="noStrike" spc="49" dirty="0">
                 <a:solidFill>
                   <a:srgbClr val="000000"/>
                 </a:solidFill>
@@ -29524,7 +29552,7 @@
               </a:rPr>
               <a:t>Create repository</a:t>
             </a:r>
-            <a:endParaRPr lang="en-US" sz="1800" b="0" strike="noStrike" spc="-1" dirty="0">
+            <a:endParaRPr lang="en-US" b="0" strike="noStrike" spc="-1" dirty="0">
               <a:solidFill>
                 <a:srgbClr val="000000"/>
               </a:solidFill>
@@ -29549,7 +29577,7 @@
               </a:tabLst>
             </a:pPr>
             <a:r>
-              <a:rPr lang="en-US" sz="1800" b="0" strike="noStrike" spc="49" dirty="0">
+              <a:rPr lang="en-US" b="0" strike="noStrike" spc="49" dirty="0">
                 <a:solidFill>
                   <a:srgbClr val="000000"/>
                 </a:solidFill>
@@ -29558,7 +29586,7 @@
               </a:rPr>
               <a:t>Add a file</a:t>
             </a:r>
-            <a:endParaRPr lang="en-US" sz="1800" b="0" strike="noStrike" spc="-1" dirty="0">
+            <a:endParaRPr lang="en-US" b="0" strike="noStrike" spc="-1" dirty="0">
               <a:solidFill>
                 <a:srgbClr val="000000"/>
               </a:solidFill>
@@ -29583,7 +29611,7 @@
               </a:tabLst>
             </a:pPr>
             <a:r>
-              <a:rPr lang="en-US" sz="1800" b="0" strike="noStrike" spc="49" dirty="0">
+              <a:rPr lang="en-US" b="0" strike="noStrike" spc="49" dirty="0">
                 <a:solidFill>
                   <a:srgbClr val="000000"/>
                 </a:solidFill>
@@ -29593,7 +29621,7 @@
               <a:t>Update </a:t>
             </a:r>
             <a:r>
-              <a:rPr lang="en-US" sz="1800" b="0" strike="noStrike" spc="49" dirty="0" err="1">
+              <a:rPr lang="en-US" b="0" strike="noStrike" spc="49" dirty="0" err="1">
                 <a:solidFill>
                   <a:srgbClr val="000000"/>
                 </a:solidFill>
@@ -29790,7 +29818,7 @@
         <p:spPr>
           <a:xfrm>
             <a:off x="1322280" y="268200"/>
-            <a:ext cx="7851960" cy="2120760"/>
+            <a:ext cx="7851960" cy="946825"/>
           </a:xfrm>
           <a:prstGeom prst="rect">
             <a:avLst/>
@@ -29813,7 +29841,7 @@
               <a:buNone/>
             </a:pPr>
             <a:r>
-              <a:rPr lang="en-US" sz="2800" b="0" strike="noStrike" cap="all" spc="148">
+              <a:rPr lang="en-US" sz="2800" b="0" strike="noStrike" cap="all" spc="148" dirty="0">
                 <a:solidFill>
                   <a:srgbClr val="000000"/>
                 </a:solidFill>
@@ -29822,7 +29850,7 @@
               </a:rPr>
               <a:t>What is Cloning?</a:t>
             </a:r>
-            <a:endParaRPr lang="en-US" sz="2800" b="0" strike="noStrike" spc="-1">
+            <a:endParaRPr lang="en-US" sz="2800" b="0" strike="noStrike" spc="-1" dirty="0">
               <a:solidFill>
                 <a:srgbClr val="000000"/>
               </a:solidFill>
@@ -29843,8 +29871,8 @@
         </p:nvSpPr>
         <p:spPr>
           <a:xfrm>
-            <a:off x="1322280" y="2763000"/>
-            <a:ext cx="7287840" cy="3406680"/>
+            <a:off x="1322279" y="2016690"/>
+            <a:ext cx="8172449" cy="4152990"/>
           </a:xfrm>
           <a:prstGeom prst="rect">
             <a:avLst/>
@@ -29873,7 +29901,7 @@
               </a:tabLst>
             </a:pPr>
             <a:r>
-              <a:rPr lang="en-US" sz="1800" b="1" strike="noStrike" spc="49">
+              <a:rPr lang="en-US" sz="2400" b="1" strike="noStrike" spc="49" dirty="0">
                 <a:solidFill>
                   <a:srgbClr val="000000"/>
                 </a:solidFill>
@@ -29881,7 +29909,7 @@
               </a:rPr>
               <a:t>Create an exact copy of your repository on your local computer</a:t>
             </a:r>
-            <a:endParaRPr lang="en-US" sz="1800" b="0" strike="noStrike" spc="-1">
+            <a:endParaRPr lang="en-US" sz="2400" b="0" strike="noStrike" spc="-1" dirty="0">
               <a:solidFill>
                 <a:srgbClr val="000000"/>
               </a:solidFill>
@@ -29906,7 +29934,7 @@
               </a:tabLst>
             </a:pPr>
             <a:r>
-              <a:rPr lang="en-US" sz="1800" b="0" strike="noStrike" spc="49">
+              <a:rPr lang="en-US" b="0" strike="noStrike" spc="49" dirty="0">
                 <a:solidFill>
                   <a:srgbClr val="000000"/>
                 </a:solidFill>
@@ -29915,7 +29943,7 @@
               </a:rPr>
               <a:t>This can be done:</a:t>
             </a:r>
-            <a:endParaRPr lang="en-US" sz="1800" b="0" strike="noStrike" spc="-1">
+            <a:endParaRPr lang="en-US" b="0" strike="noStrike" spc="-1" dirty="0">
               <a:solidFill>
                 <a:srgbClr val="000000"/>
               </a:solidFill>
@@ -29940,7 +29968,7 @@
               </a:tabLst>
             </a:pPr>
             <a:r>
-              <a:rPr lang="en-US" sz="1800" b="0" strike="noStrike" spc="49">
+              <a:rPr lang="en-US" sz="2400" b="0" strike="noStrike" spc="49" dirty="0">
                 <a:solidFill>
                   <a:srgbClr val="000000"/>
                 </a:solidFill>
@@ -29949,7 +29977,7 @@
               </a:rPr>
               <a:t>On the command line</a:t>
             </a:r>
-            <a:endParaRPr lang="en-US" sz="1800" b="0" strike="noStrike" spc="-1">
+            <a:endParaRPr lang="en-US" sz="2400" b="0" strike="noStrike" spc="-1" dirty="0">
               <a:solidFill>
                 <a:srgbClr val="000000"/>
               </a:solidFill>
@@ -29974,7 +30002,7 @@
               </a:tabLst>
             </a:pPr>
             <a:r>
-              <a:rPr lang="en-US" sz="1800" b="0" strike="noStrike" spc="49">
+              <a:rPr lang="en-US" sz="2400" b="0" strike="noStrike" spc="49" dirty="0">
                 <a:solidFill>
                   <a:srgbClr val="000000"/>
                 </a:solidFill>
@@ -29983,7 +30011,7 @@
               </a:rPr>
               <a:t>With GitHub Desktop</a:t>
             </a:r>
-            <a:endParaRPr lang="en-US" sz="1800" b="0" strike="noStrike" spc="-1">
+            <a:endParaRPr lang="en-US" sz="2400" b="0" strike="noStrike" spc="-1" dirty="0">
               <a:solidFill>
                 <a:srgbClr val="000000"/>
               </a:solidFill>
@@ -30008,7 +30036,7 @@
               </a:tabLst>
             </a:pPr>
             <a:r>
-              <a:rPr lang="en-US" sz="1800" b="0" strike="noStrike" spc="49">
+              <a:rPr lang="en-US" b="0" strike="noStrike" spc="49" dirty="0">
                 <a:solidFill>
                   <a:srgbClr val="000000"/>
                 </a:solidFill>
@@ -30017,7 +30045,7 @@
               </a:rPr>
               <a:t>You can work from your local computer and update your repository:</a:t>
             </a:r>
-            <a:endParaRPr lang="en-US" sz="1800" b="0" strike="noStrike" spc="-1">
+            <a:endParaRPr lang="en-US" b="0" strike="noStrike" spc="-1" dirty="0">
               <a:solidFill>
                 <a:srgbClr val="000000"/>
               </a:solidFill>
@@ -30042,7 +30070,7 @@
               </a:tabLst>
             </a:pPr>
             <a:r>
-              <a:rPr lang="en-US" sz="1800" b="0" strike="noStrike" spc="49">
+              <a:rPr lang="en-US" sz="2400" b="0" strike="noStrike" spc="49" dirty="0">
                 <a:solidFill>
                   <a:srgbClr val="000000"/>
                 </a:solidFill>
@@ -30051,7 +30079,7 @@
               </a:rPr>
               <a:t>Push to move new work to a remote location</a:t>
             </a:r>
-            <a:endParaRPr lang="en-US" sz="1800" b="0" strike="noStrike" spc="-1">
+            <a:endParaRPr lang="en-US" sz="2400" b="0" strike="noStrike" spc="-1" dirty="0">
               <a:solidFill>
                 <a:srgbClr val="000000"/>
               </a:solidFill>
@@ -30076,7 +30104,7 @@
               </a:tabLst>
             </a:pPr>
             <a:r>
-              <a:rPr lang="en-US" sz="1800" b="0" strike="noStrike" spc="49">
+              <a:rPr lang="en-US" sz="2400" b="0" strike="noStrike" spc="49" dirty="0">
                 <a:solidFill>
                   <a:srgbClr val="000000"/>
                 </a:solidFill>
@@ -30085,7 +30113,7 @@
               </a:rPr>
               <a:t>Pull to bring new work to your local computer</a:t>
             </a:r>
-            <a:endParaRPr lang="en-US" sz="1800" b="0" strike="noStrike" spc="-1">
+            <a:endParaRPr lang="en-US" sz="2400" b="0" strike="noStrike" spc="-1" dirty="0">
               <a:solidFill>
                 <a:srgbClr val="000000"/>
               </a:solidFill>
@@ -30195,7 +30223,7 @@
         <p:spPr>
           <a:xfrm>
             <a:off x="1322280" y="268200"/>
-            <a:ext cx="7287840" cy="2120760"/>
+            <a:ext cx="7287840" cy="1034507"/>
           </a:xfrm>
           <a:prstGeom prst="rect">
             <a:avLst/>
@@ -30218,7 +30246,7 @@
               <a:buNone/>
             </a:pPr>
             <a:r>
-              <a:rPr lang="en-US" sz="2800" b="0" strike="noStrike" cap="all" spc="148">
+              <a:rPr lang="en-US" sz="2800" b="0" strike="noStrike" cap="all" spc="148" dirty="0">
                 <a:solidFill>
                   <a:srgbClr val="000000"/>
                 </a:solidFill>
@@ -30227,7 +30255,7 @@
               </a:rPr>
               <a:t>Hands-On: Cloning</a:t>
             </a:r>
-            <a:endParaRPr lang="en-US" sz="2800" b="0" strike="noStrike" spc="-1">
+            <a:endParaRPr lang="en-US" sz="2800" b="0" strike="noStrike" spc="-1" dirty="0">
               <a:solidFill>
                 <a:srgbClr val="000000"/>
               </a:solidFill>
@@ -30248,8 +30276,8 @@
         </p:nvSpPr>
         <p:spPr>
           <a:xfrm>
-            <a:off x="1322280" y="2763000"/>
-            <a:ext cx="7287840" cy="3406680"/>
+            <a:off x="1322280" y="1954060"/>
+            <a:ext cx="7287840" cy="4215620"/>
           </a:xfrm>
           <a:prstGeom prst="rect">
             <a:avLst/>
@@ -30278,7 +30306,7 @@
               </a:tabLst>
             </a:pPr>
             <a:r>
-              <a:rPr lang="en-US" sz="1800" b="1" strike="noStrike" spc="49" dirty="0">
+              <a:rPr lang="en-US" sz="2400" b="1" strike="noStrike" spc="49" dirty="0">
                 <a:solidFill>
                   <a:srgbClr val="000000"/>
                 </a:solidFill>
@@ -30286,7 +30314,7 @@
               </a:rPr>
               <a:t>Working on your local computer</a:t>
             </a:r>
-            <a:endParaRPr lang="en-US" sz="1800" b="0" strike="noStrike" spc="-1" dirty="0">
+            <a:endParaRPr lang="en-US" sz="2400" b="0" strike="noStrike" spc="-1" dirty="0">
               <a:solidFill>
                 <a:srgbClr val="000000"/>
               </a:solidFill>
@@ -30311,7 +30339,7 @@
               </a:tabLst>
             </a:pPr>
             <a:r>
-              <a:rPr lang="en-US" sz="1800" b="0" strike="noStrike" spc="49" dirty="0">
+              <a:rPr lang="en-US" b="0" strike="noStrike" spc="49" dirty="0">
                 <a:solidFill>
                   <a:srgbClr val="000000"/>
                 </a:solidFill>
@@ -30320,7 +30348,7 @@
               </a:rPr>
               <a:t>Follow 2_cloning.md in the Practice folder</a:t>
             </a:r>
-            <a:endParaRPr lang="en-US" sz="1800" b="0" strike="noStrike" spc="-1" dirty="0">
+            <a:endParaRPr lang="en-US" b="0" strike="noStrike" spc="-1" dirty="0">
               <a:solidFill>
                 <a:srgbClr val="000000"/>
               </a:solidFill>
@@ -30345,7 +30373,7 @@
               </a:tabLst>
             </a:pPr>
             <a:r>
-              <a:rPr lang="en-US" sz="1800" b="0" strike="noStrike" spc="49" dirty="0">
+              <a:rPr lang="en-US" b="0" strike="noStrike" spc="49" dirty="0">
                 <a:solidFill>
                   <a:srgbClr val="000000"/>
                 </a:solidFill>
@@ -30354,7 +30382,7 @@
               </a:rPr>
               <a:t>Download GitHub Desktop</a:t>
             </a:r>
-            <a:endParaRPr lang="en-US" sz="1800" b="0" strike="noStrike" spc="-1" dirty="0">
+            <a:endParaRPr lang="en-US" b="0" strike="noStrike" spc="-1" dirty="0">
               <a:solidFill>
                 <a:srgbClr val="000000"/>
               </a:solidFill>
@@ -30379,7 +30407,7 @@
               </a:tabLst>
             </a:pPr>
             <a:r>
-              <a:rPr lang="en-US" sz="1800" b="0" strike="noStrike" spc="49" dirty="0">
+              <a:rPr lang="en-US" b="0" strike="noStrike" spc="49" dirty="0">
                 <a:solidFill>
                   <a:srgbClr val="000000"/>
                 </a:solidFill>
@@ -30388,7 +30416,7 @@
               </a:rPr>
               <a:t>Clone your repository</a:t>
             </a:r>
-            <a:endParaRPr lang="en-US" sz="1800" b="0" strike="noStrike" spc="-1" dirty="0">
+            <a:endParaRPr lang="en-US" b="0" strike="noStrike" spc="-1" dirty="0">
               <a:solidFill>
                 <a:srgbClr val="000000"/>
               </a:solidFill>
@@ -30413,7 +30441,7 @@
               </a:tabLst>
             </a:pPr>
             <a:r>
-              <a:rPr lang="en-US" sz="1800" b="0" strike="noStrike" spc="49" dirty="0">
+              <a:rPr lang="en-US" b="0" strike="noStrike" spc="49" dirty="0">
                 <a:solidFill>
                   <a:srgbClr val="000000"/>
                 </a:solidFill>
@@ -30422,7 +30450,7 @@
               </a:rPr>
               <a:t>Edit/add files</a:t>
             </a:r>
-            <a:endParaRPr lang="en-US" sz="1800" b="0" strike="noStrike" spc="-1" dirty="0">
+            <a:endParaRPr lang="en-US" b="0" strike="noStrike" spc="-1" dirty="0">
               <a:solidFill>
                 <a:srgbClr val="000000"/>
               </a:solidFill>
@@ -30447,7 +30475,7 @@
               </a:tabLst>
             </a:pPr>
             <a:r>
-              <a:rPr lang="en-US" sz="1800" b="0" strike="noStrike" spc="49" dirty="0">
+              <a:rPr lang="en-US" b="0" strike="noStrike" spc="49" dirty="0">
                 <a:solidFill>
                   <a:srgbClr val="000000"/>
                 </a:solidFill>
@@ -30456,7 +30484,7 @@
               </a:rPr>
               <a:t>Push </a:t>
             </a:r>
-            <a:endParaRPr lang="en-US" sz="1800" b="0" strike="noStrike" spc="-1" dirty="0">
+            <a:endParaRPr lang="en-US" b="0" strike="noStrike" spc="-1" dirty="0">
               <a:solidFill>
                 <a:srgbClr val="000000"/>
               </a:solidFill>
@@ -30476,7 +30504,7 @@
                 <a:tab pos="0" algn="l"/>
               </a:tabLst>
             </a:pPr>
-            <a:endParaRPr lang="en-US" sz="1800" b="0" strike="noStrike" spc="-1" dirty="0">
+            <a:endParaRPr lang="en-US" sz="2400" b="0" strike="noStrike" spc="-1" dirty="0">
               <a:solidFill>
                 <a:srgbClr val="000000"/>
               </a:solidFill>
@@ -30651,7 +30679,7 @@
         </p:spPr>
         <p:txBody>
           <a:bodyPr anchor="t">
-            <a:normAutofit/>
+            <a:normAutofit lnSpcReduction="10000"/>
           </a:bodyPr>
           <a:lstStyle/>
           <a:p>
@@ -30669,7 +30697,7 @@
               <a:buChar char="•"/>
             </a:pPr>
             <a:r>
-              <a:rPr lang="en-US" sz="1800" b="0" strike="noStrike" spc="49" dirty="0">
+              <a:rPr lang="en-US" sz="2400" b="0" strike="noStrike" spc="49" dirty="0">
                 <a:solidFill>
                   <a:srgbClr val="000000"/>
                 </a:solidFill>
@@ -30678,7 +30706,7 @@
               </a:rPr>
               <a:t>A system that records your files over time.</a:t>
             </a:r>
-            <a:endParaRPr lang="en-US" sz="1800" b="0" strike="noStrike" spc="-1" dirty="0">
+            <a:endParaRPr lang="en-US" sz="2400" b="0" strike="noStrike" spc="-1" dirty="0">
               <a:solidFill>
                 <a:srgbClr val="000000"/>
               </a:solidFill>
@@ -30692,7 +30720,7 @@
               </a:spcBef>
             </a:pPr>
             <a:r>
-              <a:rPr lang="en-US" sz="1800" b="1" dirty="0">
+              <a:rPr lang="en-US" sz="2400" b="1" dirty="0">
                 <a:solidFill>
                   <a:srgbClr val="0E0E0E"/>
                 </a:solidFill>
@@ -30702,7 +30730,7 @@
               <a:t>Collaboration:</a:t>
             </a:r>
             <a:r>
-              <a:rPr lang="en-US" sz="1800" dirty="0">
+              <a:rPr lang="en-US" sz="2400" dirty="0">
                 <a:solidFill>
                   <a:srgbClr val="0E0E0E"/>
                 </a:solidFill>
@@ -30719,7 +30747,7 @@
               </a:spcBef>
             </a:pPr>
             <a:r>
-              <a:rPr lang="en-US" sz="1800" b="1" dirty="0">
+              <a:rPr lang="en-US" sz="2400" b="1" dirty="0">
                 <a:solidFill>
                   <a:srgbClr val="0E0E0E"/>
                 </a:solidFill>
@@ -30729,7 +30757,7 @@
               <a:t>History Tracking:</a:t>
             </a:r>
             <a:r>
-              <a:rPr lang="en-US" sz="1800" dirty="0">
+              <a:rPr lang="en-US" sz="2400" dirty="0">
                 <a:solidFill>
                   <a:srgbClr val="0E0E0E"/>
                 </a:solidFill>
@@ -30752,7 +30780,7 @@
                 <a:tab pos="0" algn="l"/>
               </a:tabLst>
             </a:pPr>
-            <a:endParaRPr lang="en-US" sz="1800" b="0" strike="noStrike" spc="-1" dirty="0">
+            <a:endParaRPr lang="en-US" sz="2400" b="0" strike="noStrike" spc="-1" dirty="0">
               <a:solidFill>
                 <a:srgbClr val="000000"/>
               </a:solidFill>
@@ -30766,7 +30794,7 @@
               </a:spcBef>
             </a:pPr>
             <a:r>
-              <a:rPr lang="en-US" sz="1800" b="0" strike="noStrike" spc="49" dirty="0">
+              <a:rPr lang="en-US" sz="2400" b="0" strike="noStrike" spc="49" dirty="0">
                 <a:solidFill>
                   <a:srgbClr val="000000"/>
                 </a:solidFill>
@@ -30776,7 +30804,7 @@
               <a:t>Example: </a:t>
             </a:r>
             <a:r>
-              <a:rPr lang="en-US" sz="1800" dirty="0">
+              <a:rPr lang="en-US" sz="2400" dirty="0">
                 <a:solidFill>
                   <a:srgbClr val="0E0E0E"/>
                 </a:solidFill>
@@ -30799,7 +30827,7 @@
                 <a:tab pos="0" algn="l"/>
               </a:tabLst>
             </a:pPr>
-            <a:endParaRPr lang="en-US" sz="1800" b="0" strike="noStrike" spc="-1" dirty="0">
+            <a:endParaRPr lang="en-US" sz="2400" b="0" strike="noStrike" spc="-1" dirty="0">
               <a:solidFill>
                 <a:srgbClr val="000000"/>
               </a:solidFill>
@@ -32641,7 +32669,7 @@
         </p:nvSpPr>
         <p:spPr>
           <a:xfrm>
-            <a:off x="3681350" y="5160285"/>
+            <a:off x="3681350" y="5135233"/>
             <a:ext cx="880753" cy="369332"/>
           </a:xfrm>
           <a:prstGeom prst="rect">
@@ -33502,7 +33530,7 @@
         </p:nvSpPr>
         <p:spPr>
           <a:xfrm>
-            <a:off x="3681350" y="5160285"/>
+            <a:off x="3681350" y="5135233"/>
             <a:ext cx="880753" cy="369332"/>
           </a:xfrm>
           <a:prstGeom prst="rect">
@@ -34359,7 +34387,7 @@
         </p:nvSpPr>
         <p:spPr>
           <a:xfrm>
-            <a:off x="3681350" y="5160285"/>
+            <a:off x="3681350" y="5135233"/>
             <a:ext cx="880753" cy="369332"/>
           </a:xfrm>
           <a:prstGeom prst="rect">
@@ -34650,7 +34678,7 @@
         </p:nvSpPr>
         <p:spPr>
           <a:xfrm>
-            <a:off x="7689272" y="5160284"/>
+            <a:off x="7689272" y="5135232"/>
             <a:ext cx="880753" cy="369332"/>
           </a:xfrm>
           <a:prstGeom prst="rect">
@@ -35373,7 +35401,7 @@
         </p:nvSpPr>
         <p:spPr>
           <a:xfrm>
-            <a:off x="3681350" y="5160285"/>
+            <a:off x="3681350" y="5135233"/>
             <a:ext cx="880753" cy="369332"/>
           </a:xfrm>
           <a:prstGeom prst="rect">
@@ -35664,7 +35692,7 @@
         </p:nvSpPr>
         <p:spPr>
           <a:xfrm>
-            <a:off x="7689272" y="5160284"/>
+            <a:off x="7689272" y="5135232"/>
             <a:ext cx="880753" cy="369332"/>
           </a:xfrm>
           <a:prstGeom prst="rect">
@@ -36479,7 +36507,7 @@
         </p:nvSpPr>
         <p:spPr>
           <a:xfrm>
-            <a:off x="3681350" y="5160285"/>
+            <a:off x="3681350" y="5135233"/>
             <a:ext cx="880753" cy="369332"/>
           </a:xfrm>
           <a:prstGeom prst="rect">
@@ -36770,7 +36798,7 @@
         </p:nvSpPr>
         <p:spPr>
           <a:xfrm>
-            <a:off x="7689272" y="5160284"/>
+            <a:off x="7689272" y="5135232"/>
             <a:ext cx="880753" cy="369332"/>
           </a:xfrm>
           <a:prstGeom prst="rect">
@@ -37151,7 +37179,7 @@
         </p:nvSpPr>
         <p:spPr>
           <a:xfrm>
-            <a:off x="7649688" y="4386562"/>
+            <a:off x="7649688" y="4348984"/>
             <a:ext cx="880753" cy="369332"/>
           </a:xfrm>
           <a:prstGeom prst="rect">
@@ -37902,7 +37930,7 @@
         </p:nvSpPr>
         <p:spPr>
           <a:xfrm>
-            <a:off x="3681350" y="5160285"/>
+            <a:off x="3681350" y="5135233"/>
             <a:ext cx="880753" cy="369332"/>
           </a:xfrm>
           <a:prstGeom prst="rect">
@@ -38193,7 +38221,7 @@
         </p:nvSpPr>
         <p:spPr>
           <a:xfrm>
-            <a:off x="7689272" y="5160284"/>
+            <a:off x="7689272" y="5135232"/>
             <a:ext cx="880753" cy="369332"/>
           </a:xfrm>
           <a:prstGeom prst="rect">
@@ -38574,7 +38602,7 @@
         </p:nvSpPr>
         <p:spPr>
           <a:xfrm>
-            <a:off x="7649688" y="4398285"/>
+            <a:off x="7649688" y="4360707"/>
             <a:ext cx="880753" cy="369332"/>
           </a:xfrm>
           <a:prstGeom prst="rect">
@@ -38716,7 +38744,7 @@
         </p:nvSpPr>
         <p:spPr>
           <a:xfrm>
-            <a:off x="7689271" y="3990069"/>
+            <a:off x="7689271" y="3965017"/>
             <a:ext cx="880753" cy="369332"/>
           </a:xfrm>
           <a:prstGeom prst="rect">
@@ -38888,7 +38916,7 @@
               </a:tabLst>
             </a:pPr>
             <a:r>
-              <a:rPr lang="en-US" sz="1800" b="0" strike="noStrike" spc="49" dirty="0">
+              <a:rPr lang="en-US" sz="2400" b="0" strike="noStrike" spc="49" dirty="0">
                 <a:solidFill>
                   <a:srgbClr val="000000"/>
                 </a:solidFill>
@@ -38897,7 +38925,7 @@
               </a:rPr>
               <a:t>Example: Google Docs</a:t>
             </a:r>
-            <a:endParaRPr lang="en-US" sz="1800" b="0" strike="noStrike" spc="-1" dirty="0">
+            <a:endParaRPr lang="en-US" sz="2400" b="0" strike="noStrike" spc="-1" dirty="0">
               <a:solidFill>
                 <a:srgbClr val="000000"/>
               </a:solidFill>
@@ -39614,7 +39642,7 @@
         </p:nvSpPr>
         <p:spPr>
           <a:xfrm>
-            <a:off x="3681350" y="5160285"/>
+            <a:off x="3681350" y="5135233"/>
             <a:ext cx="880753" cy="369332"/>
           </a:xfrm>
           <a:prstGeom prst="rect">
@@ -39905,7 +39933,7 @@
         </p:nvSpPr>
         <p:spPr>
           <a:xfrm>
-            <a:off x="7689272" y="5160284"/>
+            <a:off x="7689272" y="5135232"/>
             <a:ext cx="880753" cy="369332"/>
           </a:xfrm>
           <a:prstGeom prst="rect">
@@ -40286,7 +40314,7 @@
         </p:nvSpPr>
         <p:spPr>
           <a:xfrm>
-            <a:off x="7649688" y="4398285"/>
+            <a:off x="7649688" y="4360707"/>
             <a:ext cx="880753" cy="369332"/>
           </a:xfrm>
           <a:prstGeom prst="rect">
@@ -40483,7 +40511,7 @@
         </p:nvSpPr>
         <p:spPr>
           <a:xfrm>
-            <a:off x="7689271" y="3990069"/>
+            <a:off x="7689271" y="3965017"/>
             <a:ext cx="880753" cy="369332"/>
           </a:xfrm>
           <a:prstGeom prst="rect">
@@ -41116,7 +41144,7 @@
         </p:nvSpPr>
         <p:spPr>
           <a:xfrm>
-            <a:off x="3681350" y="5160285"/>
+            <a:off x="3681350" y="5135233"/>
             <a:ext cx="880753" cy="369332"/>
           </a:xfrm>
           <a:prstGeom prst="rect">
@@ -41407,7 +41435,7 @@
         </p:nvSpPr>
         <p:spPr>
           <a:xfrm>
-            <a:off x="7689272" y="5160284"/>
+            <a:off x="7689272" y="5135232"/>
             <a:ext cx="880753" cy="369332"/>
           </a:xfrm>
           <a:prstGeom prst="rect">
@@ -41788,7 +41816,7 @@
         </p:nvSpPr>
         <p:spPr>
           <a:xfrm>
-            <a:off x="7649688" y="4398285"/>
+            <a:off x="7649688" y="4360707"/>
             <a:ext cx="880753" cy="369332"/>
           </a:xfrm>
           <a:prstGeom prst="rect">
@@ -41924,7 +41952,7 @@
         </p:nvSpPr>
         <p:spPr>
           <a:xfrm rot="10800000">
-            <a:off x="7204363" y="3998024"/>
+            <a:off x="7204363" y="3985498"/>
             <a:ext cx="1187532" cy="108857"/>
           </a:xfrm>
           <a:prstGeom prst="rightArrow">
@@ -41984,7 +42012,7 @@
         </p:nvSpPr>
         <p:spPr>
           <a:xfrm>
-            <a:off x="7649688" y="3755038"/>
+            <a:off x="7649688" y="3704934"/>
             <a:ext cx="880753" cy="369332"/>
           </a:xfrm>
           <a:prstGeom prst="rect">
@@ -42184,7 +42212,7 @@
         </p:nvSpPr>
         <p:spPr>
           <a:xfrm>
-            <a:off x="7689271" y="4001792"/>
+            <a:off x="7689271" y="3976740"/>
             <a:ext cx="880753" cy="369332"/>
           </a:xfrm>
           <a:prstGeom prst="rect">
@@ -43005,7 +43033,7 @@
         </p:nvSpPr>
         <p:spPr>
           <a:xfrm>
-            <a:off x="7689272" y="5160284"/>
+            <a:off x="7689272" y="5122706"/>
             <a:ext cx="880753" cy="369332"/>
           </a:xfrm>
           <a:prstGeom prst="rect">
@@ -43025,7 +43053,7 @@
             <a:pPr algn="l"/>
             <a:r>
               <a:rPr lang="en-US" dirty="0"/>
-              <a:t>Pull</a:t>
+              <a:t>Clone</a:t>
             </a:r>
           </a:p>
         </p:txBody>
@@ -43386,7 +43414,7 @@
         </p:nvSpPr>
         <p:spPr>
           <a:xfrm>
-            <a:off x="7649688" y="4386562"/>
+            <a:off x="7649688" y="4361510"/>
             <a:ext cx="880753" cy="369332"/>
           </a:xfrm>
           <a:prstGeom prst="rect">
@@ -43522,7 +43550,7 @@
         </p:nvSpPr>
         <p:spPr>
           <a:xfrm rot="10800000">
-            <a:off x="7204363" y="3998024"/>
+            <a:off x="7204363" y="3985498"/>
             <a:ext cx="1187532" cy="108857"/>
           </a:xfrm>
           <a:prstGeom prst="rightArrow">
@@ -43582,7 +43610,7 @@
         </p:nvSpPr>
         <p:spPr>
           <a:xfrm>
-            <a:off x="7649688" y="3755038"/>
+            <a:off x="7649688" y="3704934"/>
             <a:ext cx="880753" cy="369332"/>
           </a:xfrm>
           <a:prstGeom prst="rect">
@@ -43821,7 +43849,7 @@
         </p:nvSpPr>
         <p:spPr>
           <a:xfrm>
-            <a:off x="3681349" y="3755037"/>
+            <a:off x="3681349" y="3729985"/>
             <a:ext cx="880753" cy="369332"/>
           </a:xfrm>
           <a:prstGeom prst="rect">
@@ -44096,7 +44124,7 @@
         </p:nvSpPr>
         <p:spPr>
           <a:xfrm>
-            <a:off x="7689271" y="4001792"/>
+            <a:off x="7689271" y="3976740"/>
             <a:ext cx="880753" cy="369332"/>
           </a:xfrm>
           <a:prstGeom prst="rect">
@@ -44135,7 +44163,7 @@
         </p:nvSpPr>
         <p:spPr>
           <a:xfrm>
-            <a:off x="3681350" y="5160285"/>
+            <a:off x="3681350" y="5135233"/>
             <a:ext cx="880753" cy="369332"/>
           </a:xfrm>
           <a:prstGeom prst="rect">
@@ -45016,7 +45044,7 @@
         </p:nvSpPr>
         <p:spPr>
           <a:xfrm>
-            <a:off x="7689272" y="5160284"/>
+            <a:off x="7689272" y="5135232"/>
             <a:ext cx="880753" cy="369332"/>
           </a:xfrm>
           <a:prstGeom prst="rect">
@@ -45036,7 +45064,7 @@
             <a:pPr algn="l"/>
             <a:r>
               <a:rPr lang="en-US" dirty="0"/>
-              <a:t>Pull</a:t>
+              <a:t>Clone</a:t>
             </a:r>
           </a:p>
         </p:txBody>
@@ -45397,7 +45425,7 @@
         </p:nvSpPr>
         <p:spPr>
           <a:xfrm>
-            <a:off x="7649688" y="4398285"/>
+            <a:off x="7649688" y="4373233"/>
             <a:ext cx="880753" cy="369332"/>
           </a:xfrm>
           <a:prstGeom prst="rect">
@@ -45533,7 +45561,7 @@
         </p:nvSpPr>
         <p:spPr>
           <a:xfrm rot="10800000">
-            <a:off x="7204363" y="3998024"/>
+            <a:off x="7204363" y="3985498"/>
             <a:ext cx="1187532" cy="108857"/>
           </a:xfrm>
           <a:prstGeom prst="rightArrow">
@@ -45593,7 +45621,7 @@
         </p:nvSpPr>
         <p:spPr>
           <a:xfrm>
-            <a:off x="7649688" y="3755038"/>
+            <a:off x="7649688" y="3704934"/>
             <a:ext cx="880753" cy="369332"/>
           </a:xfrm>
           <a:prstGeom prst="rect">
@@ -45832,7 +45860,7 @@
         </p:nvSpPr>
         <p:spPr>
           <a:xfrm>
-            <a:off x="3681349" y="3766760"/>
+            <a:off x="3681349" y="3741708"/>
             <a:ext cx="880753" cy="369332"/>
           </a:xfrm>
           <a:prstGeom prst="rect">
@@ -46201,7 +46229,7 @@
         </p:nvSpPr>
         <p:spPr>
           <a:xfrm>
-            <a:off x="7689271" y="4001792"/>
+            <a:off x="7689271" y="3976740"/>
             <a:ext cx="880753" cy="369332"/>
           </a:xfrm>
           <a:prstGeom prst="rect">
@@ -46240,7 +46268,7 @@
         </p:nvSpPr>
         <p:spPr>
           <a:xfrm>
-            <a:off x="3681350" y="5172008"/>
+            <a:off x="3681350" y="5146956"/>
             <a:ext cx="880753" cy="369332"/>
           </a:xfrm>
           <a:prstGeom prst="rect">
@@ -46371,7 +46399,12 @@
             <p:ph type="title"/>
           </p:nvPr>
         </p:nvSpPr>
-        <p:spPr/>
+        <p:spPr>
+          <a:xfrm>
+            <a:off x="1322318" y="268360"/>
+            <a:ext cx="7288282" cy="1197185"/>
+          </a:xfrm>
+        </p:spPr>
         <p:txBody>
           <a:bodyPr/>
           <a:lstStyle/>
@@ -46399,7 +46432,12 @@
             <p:ph sz="half" idx="2"/>
           </p:nvPr>
         </p:nvSpPr>
-        <p:spPr/>
+        <p:spPr>
+          <a:xfrm>
+            <a:off x="1322388" y="1916482"/>
+            <a:ext cx="8047080" cy="4534422"/>
+          </a:xfrm>
+        </p:spPr>
         <p:txBody>
           <a:bodyPr>
             <a:normAutofit/>
@@ -46411,7 +46449,7 @@
               <a:buChar char="•"/>
             </a:pPr>
             <a:r>
-              <a:rPr lang="en-US" b="1" dirty="0">
+              <a:rPr lang="en-US" sz="2400" b="1" dirty="0">
                 <a:solidFill>
                   <a:srgbClr val="0E0E0E"/>
                 </a:solidFill>
@@ -46421,7 +46459,7 @@
               <a:t>Share and Work Together: </a:t>
             </a:r>
             <a:r>
-              <a:rPr lang="en-US" b="0" dirty="0">
+              <a:rPr lang="en-US" sz="2400" b="0" dirty="0">
                 <a:solidFill>
                   <a:srgbClr val="0E0E0E"/>
                 </a:solidFill>
@@ -46440,7 +46478,7 @@
               <a:buChar char="•"/>
             </a:pPr>
             <a:r>
-              <a:rPr lang="en-US" b="1" dirty="0">
+              <a:rPr lang="en-US" sz="2400" b="1" dirty="0">
                 <a:solidFill>
                   <a:srgbClr val="0E0E0E"/>
                 </a:solidFill>
@@ -46450,7 +46488,7 @@
               <a:t>Syncing is Key:</a:t>
             </a:r>
             <a:r>
-              <a:rPr lang="en-US" dirty="0">
+              <a:rPr lang="en-US" sz="2400" dirty="0">
                 <a:solidFill>
                   <a:srgbClr val="0E0E0E"/>
                 </a:solidFill>
@@ -46460,7 +46498,7 @@
               <a:t> </a:t>
             </a:r>
             <a:r>
-              <a:rPr lang="en-US" b="0" dirty="0">
+              <a:rPr lang="en-US" sz="2400" b="0" dirty="0">
                 <a:solidFill>
                   <a:srgbClr val="0E0E0E"/>
                 </a:solidFill>
@@ -46476,7 +46514,7 @@
               <a:buChar char="•"/>
             </a:pPr>
             <a:r>
-              <a:rPr lang="en-US" b="1" dirty="0">
+              <a:rPr lang="en-US" sz="2400" b="1" dirty="0">
                 <a:solidFill>
                   <a:srgbClr val="0E0E0E"/>
                 </a:solidFill>
@@ -46486,7 +46524,7 @@
               <a:t>Track and Communicate Changes:</a:t>
             </a:r>
             <a:r>
-              <a:rPr lang="en-US" b="1" dirty="0">
+              <a:rPr lang="en-US" sz="2400" b="1" dirty="0">
                 <a:solidFill>
                   <a:srgbClr val="0E0E0E"/>
                 </a:solidFill>
@@ -46495,7 +46533,7 @@
               <a:t> </a:t>
             </a:r>
             <a:r>
-              <a:rPr lang="en-US" b="0" dirty="0">
+              <a:rPr lang="en-US" sz="2400" b="0" dirty="0">
                 <a:solidFill>
                   <a:srgbClr val="0E0E0E"/>
                 </a:solidFill>
@@ -46504,7 +46542,7 @@
               </a:rPr>
               <a:t>Use clear commit messages to describe your updates so everyone understands what’s been changed and why. </a:t>
             </a:r>
-            <a:endParaRPr lang="en-US" dirty="0"/>
+            <a:endParaRPr lang="en-US" sz="2400" dirty="0"/>
           </a:p>
         </p:txBody>
       </p:sp>
@@ -46557,7 +46595,7 @@
         <p:spPr>
           <a:xfrm>
             <a:off x="1322318" y="268360"/>
-            <a:ext cx="2137727" cy="1229136"/>
+            <a:ext cx="2137727" cy="871508"/>
           </a:xfrm>
         </p:spPr>
         <p:txBody>
@@ -46595,8 +46633,8 @@
         </p:blipFill>
         <p:spPr>
           <a:xfrm>
-            <a:off x="3585594" y="599415"/>
-            <a:ext cx="8606406" cy="5906761"/>
+            <a:off x="4633565" y="0"/>
+            <a:ext cx="9992402" cy="6858000"/>
           </a:xfrm>
         </p:spPr>
       </p:pic>
@@ -46649,8 +46687,8 @@
         </p:nvSpPr>
         <p:spPr>
           <a:xfrm>
-            <a:off x="461218" y="1762784"/>
-            <a:ext cx="3124376" cy="4593565"/>
+            <a:off x="448692" y="1360570"/>
+            <a:ext cx="4073204" cy="5178341"/>
           </a:xfrm>
           <a:prstGeom prst="rect">
             <a:avLst/>
@@ -46664,7 +46702,7 @@
           <a:lstStyle/>
           <a:p>
             <a:r>
-              <a:rPr lang="en-US" b="1" dirty="0">
+              <a:rPr lang="en-US" sz="2200" b="1" dirty="0">
                 <a:solidFill>
                   <a:srgbClr val="0E0E0E"/>
                 </a:solidFill>
@@ -46673,7 +46711,7 @@
               </a:rPr>
               <a:t>What Are Conflicts?</a:t>
             </a:r>
-            <a:endParaRPr lang="en-US" dirty="0">
+            <a:endParaRPr lang="en-US" sz="2200" dirty="0">
               <a:solidFill>
                 <a:srgbClr val="0E0E0E"/>
               </a:solidFill>
@@ -46688,7 +46726,7 @@
               </a:spcBef>
             </a:pPr>
             <a:r>
-              <a:rPr lang="en-US" dirty="0">
+              <a:rPr lang="en-US" sz="2200" dirty="0">
                 <a:solidFill>
                   <a:srgbClr val="0E0E0E"/>
                 </a:solidFill>
@@ -46700,7 +46738,7 @@
           </a:p>
           <a:p>
             <a:r>
-              <a:rPr lang="en-US" b="1" dirty="0">
+              <a:rPr lang="en-US" sz="2200" b="1" dirty="0">
                 <a:solidFill>
                   <a:srgbClr val="0E0E0E"/>
                 </a:solidFill>
@@ -46709,7 +46747,7 @@
               </a:rPr>
               <a:t>How to Resolve Conflicts?</a:t>
             </a:r>
-            <a:endParaRPr lang="en-US" dirty="0">
+            <a:endParaRPr lang="en-US" sz="2200" dirty="0">
               <a:solidFill>
                 <a:srgbClr val="0E0E0E"/>
               </a:solidFill>
@@ -46724,7 +46762,7 @@
               </a:spcBef>
             </a:pPr>
             <a:r>
-              <a:rPr lang="en-US" dirty="0">
+              <a:rPr lang="en-US" sz="2200" dirty="0">
                 <a:solidFill>
                   <a:srgbClr val="0E0E0E"/>
                 </a:solidFill>
@@ -46741,7 +46779,7 @@
               </a:spcBef>
             </a:pPr>
             <a:r>
-              <a:rPr lang="en-US" dirty="0">
+              <a:rPr lang="en-US" sz="2200" dirty="0">
                 <a:solidFill>
                   <a:srgbClr val="0E0E0E"/>
                 </a:solidFill>
@@ -46799,7 +46837,12 @@
             <p:ph type="title"/>
           </p:nvPr>
         </p:nvSpPr>
-        <p:spPr/>
+        <p:spPr>
+          <a:xfrm>
+            <a:off x="1322318" y="268360"/>
+            <a:ext cx="7288282" cy="984243"/>
+          </a:xfrm>
+        </p:spPr>
         <p:txBody>
           <a:bodyPr/>
           <a:lstStyle/>
@@ -46829,7 +46872,9 @@
         </p:nvSpPr>
         <p:spPr/>
         <p:txBody>
-          <a:bodyPr/>
+          <a:bodyPr>
+            <a:normAutofit/>
+          </a:bodyPr>
           <a:lstStyle/>
           <a:p>
             <a:pPr marL="285750" indent="-285750">
@@ -46837,7 +46882,7 @@
               <a:buChar char="•"/>
             </a:pPr>
             <a:r>
-              <a:rPr lang="en-US" b="0" dirty="0"/>
+              <a:rPr lang="en-US" sz="2400" b="0" dirty="0"/>
               <a:t>Follow the 3_collaborate.md file in the Practice folder</a:t>
             </a:r>
           </a:p>
@@ -46847,7 +46892,7 @@
               <a:buChar char="•"/>
             </a:pPr>
             <a:r>
-              <a:rPr lang="en-US" b="0" dirty="0"/>
+              <a:rPr lang="en-US" sz="2400" b="0" dirty="0"/>
               <a:t>Add a collaborator to your repository </a:t>
             </a:r>
           </a:p>
@@ -46857,7 +46902,7 @@
               <a:buChar char="•"/>
             </a:pPr>
             <a:r>
-              <a:rPr lang="en-US" b="0" dirty="0"/>
+              <a:rPr lang="en-US" sz="2400" b="0" dirty="0"/>
               <a:t>Make conflicting edits</a:t>
             </a:r>
           </a:p>
@@ -46867,7 +46912,7 @@
               <a:buChar char="•"/>
             </a:pPr>
             <a:r>
-              <a:rPr lang="en-US" b="0" dirty="0"/>
+              <a:rPr lang="en-US" sz="2400" b="0" dirty="0"/>
               <a:t>Resolve conflicts </a:t>
             </a:r>
           </a:p>
@@ -46876,7 +46921,7 @@
               <a:buFont typeface="Arial" panose="020B0604020202020204" pitchFamily="34" charset="0"/>
               <a:buChar char="•"/>
             </a:pPr>
-            <a:endParaRPr lang="en-US" b="0" dirty="0"/>
+            <a:endParaRPr lang="en-US" sz="2400" b="0" dirty="0"/>
           </a:p>
         </p:txBody>
       </p:sp>
@@ -47039,7 +47084,7 @@
               <a:buNone/>
             </a:pPr>
             <a:r>
-              <a:rPr lang="en-US" sz="2800" b="0" strike="noStrike" cap="all" spc="148">
+              <a:rPr lang="en-US" sz="2800" b="0" strike="noStrike" cap="all" spc="148" dirty="0">
                 <a:solidFill>
                   <a:srgbClr val="000000"/>
                 </a:solidFill>
@@ -47048,7 +47093,7 @@
               </a:rPr>
               <a:t>Next Session:</a:t>
             </a:r>
-            <a:endParaRPr lang="en-US" sz="2800" b="0" strike="noStrike" spc="-1">
+            <a:endParaRPr lang="en-US" sz="2800" b="0" strike="noStrike" spc="-1" dirty="0">
               <a:solidFill>
                 <a:srgbClr val="000000"/>
               </a:solidFill>
@@ -47100,7 +47145,7 @@
               <a:buChar char="•"/>
             </a:pPr>
             <a:r>
-              <a:rPr lang="en-US" b="1" strike="noStrike" spc="49" dirty="0">
+              <a:rPr lang="en-US" sz="2800" b="1" strike="noStrike" spc="49" dirty="0">
                 <a:solidFill>
                   <a:srgbClr val="000000"/>
                 </a:solidFill>
@@ -47125,7 +47170,7 @@
               <a:buChar char="•"/>
             </a:pPr>
             <a:r>
-              <a:rPr lang="en-US" sz="1800" b="0" strike="noStrike" spc="49" dirty="0">
+              <a:rPr lang="en-US" b="0" strike="noStrike" spc="49" dirty="0">
                 <a:solidFill>
                   <a:srgbClr val="000000"/>
                 </a:solidFill>
@@ -47150,7 +47195,7 @@
               <a:buChar char="•"/>
             </a:pPr>
             <a:r>
-              <a:rPr lang="en-US" b="1" strike="noStrike" spc="49" dirty="0">
+              <a:rPr lang="en-US" sz="2800" b="1" strike="noStrike" spc="49" dirty="0">
                 <a:solidFill>
                   <a:srgbClr val="000000"/>
                 </a:solidFill>
@@ -47159,7 +47204,7 @@
               </a:rPr>
               <a:t>Create your own personal website:</a:t>
             </a:r>
-            <a:endParaRPr lang="en-US" b="1" spc="-1" dirty="0">
+            <a:endParaRPr lang="en-US" sz="2800" b="1" spc="-1" dirty="0">
               <a:solidFill>
                 <a:srgbClr val="000000"/>
               </a:solidFill>
@@ -47181,7 +47226,7 @@
               <a:buChar char="•"/>
             </a:pPr>
             <a:r>
-              <a:rPr lang="en-US" sz="1800" b="0" strike="noStrike" spc="49" dirty="0">
+              <a:rPr lang="en-US" b="0" strike="noStrike" spc="49" dirty="0">
                 <a:solidFill>
                   <a:srgbClr val="000000"/>
                 </a:solidFill>
@@ -47190,7 +47235,7 @@
               </a:rPr>
               <a:t>Creating a GitHub Pages site</a:t>
             </a:r>
-            <a:endParaRPr lang="en-US" sz="1800" b="0" strike="noStrike" spc="-1" dirty="0">
+            <a:endParaRPr lang="en-US" b="0" strike="noStrike" spc="-1" dirty="0">
               <a:solidFill>
                 <a:srgbClr val="000000"/>
               </a:solidFill>
@@ -47625,8 +47670,8 @@
         </p:nvSpPr>
         <p:spPr>
           <a:xfrm>
-            <a:off x="1322280" y="2763000"/>
-            <a:ext cx="3646080" cy="3406680"/>
+            <a:off x="275573" y="2388960"/>
+            <a:ext cx="4692787" cy="4200840"/>
           </a:xfrm>
           <a:prstGeom prst="rect">
             <a:avLst/>
@@ -47638,7 +47683,7 @@
         </p:spPr>
         <p:txBody>
           <a:bodyPr anchor="t">
-            <a:normAutofit/>
+            <a:normAutofit lnSpcReduction="10000"/>
           </a:bodyPr>
           <a:lstStyle/>
           <a:p>
@@ -47656,7 +47701,7 @@
               <a:buChar char="•"/>
             </a:pPr>
             <a:r>
-              <a:rPr lang="en-US" sz="1800" b="0" strike="noStrike" spc="49" dirty="0">
+              <a:rPr lang="en-US" b="0" strike="noStrike" spc="49" dirty="0">
                 <a:solidFill>
                   <a:srgbClr val="000000"/>
                 </a:solidFill>
@@ -47666,7 +47711,7 @@
               <a:t>Git is a version </a:t>
             </a:r>
             <a:r>
-              <a:rPr lang="en-US" sz="1800" spc="49" dirty="0">
+              <a:rPr lang="en-US" spc="49" dirty="0">
                 <a:solidFill>
                   <a:srgbClr val="000000"/>
                 </a:solidFill>
@@ -47676,7 +47721,7 @@
               <a:t>c</a:t>
             </a:r>
             <a:r>
-              <a:rPr lang="en-US" sz="1800" b="0" strike="noStrike" spc="49" dirty="0">
+              <a:rPr lang="en-US" b="0" strike="noStrike" spc="49" dirty="0">
                 <a:solidFill>
                   <a:srgbClr val="000000"/>
                 </a:solidFill>
@@ -47701,7 +47746,7 @@
               <a:buChar char="•"/>
             </a:pPr>
             <a:r>
-              <a:rPr lang="en-US" sz="1800" spc="49" dirty="0">
+              <a:rPr lang="en-US" spc="49" dirty="0">
                 <a:solidFill>
                   <a:srgbClr val="000000"/>
                 </a:solidFill>
@@ -47709,7 +47754,7 @@
               </a:rPr>
               <a:t>It tracks changes to files and allows collaboration</a:t>
             </a:r>
-            <a:endParaRPr lang="en-US" sz="1800" b="0" strike="noStrike" spc="-1" dirty="0">
+            <a:endParaRPr lang="en-US" b="0" strike="noStrike" spc="-1" dirty="0">
               <a:solidFill>
                 <a:srgbClr val="000000"/>
               </a:solidFill>
@@ -47731,7 +47776,7 @@
               <a:buChar char="•"/>
             </a:pPr>
             <a:r>
-              <a:rPr lang="en-US" sz="1800" b="0" strike="noStrike" spc="49" dirty="0">
+              <a:rPr lang="en-US" b="0" strike="noStrike" spc="49" dirty="0">
                 <a:solidFill>
                   <a:srgbClr val="000000"/>
                 </a:solidFill>
@@ -47756,7 +47801,7 @@
               <a:buChar char="•"/>
             </a:pPr>
             <a:r>
-              <a:rPr lang="en-US" sz="1800" b="0" strike="noStrike" spc="49" dirty="0">
+              <a:rPr lang="en-US" b="0" strike="noStrike" spc="49" dirty="0">
                 <a:solidFill>
                   <a:srgbClr val="000000"/>
                 </a:solidFill>
@@ -47765,7 +47810,7 @@
               </a:rPr>
               <a:t>Commits create “snapshots” of the entire project, not just the differences</a:t>
             </a:r>
-            <a:endParaRPr lang="en-US" sz="1800" b="0" strike="noStrike" spc="-1" dirty="0">
+            <a:endParaRPr lang="en-US" b="0" strike="noStrike" spc="-1" dirty="0">
               <a:solidFill>
                 <a:srgbClr val="000000"/>
               </a:solidFill>
@@ -47787,7 +47832,7 @@
               <a:buChar char="•"/>
             </a:pPr>
             <a:r>
-              <a:rPr lang="en-US" sz="1800" b="0" strike="noStrike" spc="49" dirty="0">
+              <a:rPr lang="en-US" b="0" strike="noStrike" spc="49" dirty="0">
                 <a:solidFill>
                   <a:srgbClr val="000000"/>
                 </a:solidFill>
@@ -47796,7 +47841,7 @@
               </a:rPr>
               <a:t>Can be stored in a remote location</a:t>
             </a:r>
-            <a:endParaRPr lang="en-US" sz="1800" b="0" strike="noStrike" spc="-1" dirty="0">
+            <a:endParaRPr lang="en-US" b="0" strike="noStrike" spc="-1" dirty="0">
               <a:solidFill>
                 <a:srgbClr val="000000"/>
               </a:solidFill>
@@ -47930,7 +47975,7 @@
         <p:cNvPr id="1" name="">
           <a:extLst>
             <a:ext uri="{FF2B5EF4-FFF2-40B4-BE49-F238E27FC236}">
-              <a16:creationId xmlns:a16="http://schemas.microsoft.com/office/drawing/2014/main" id="{773EA2AC-D9CB-C650-4D27-23230C09BBD7}"/>
+              <a16:creationId xmlns:a16="http://schemas.microsoft.com/office/drawing/2014/main" id="{7683C836-C36F-EB5F-8D34-97336370B231}"/>
             </a:ext>
           </a:extLst>
         </p:cNvPr>
@@ -47950,7 +47995,7 @@
           <p:cNvPr id="225" name="PlaceHolder 1">
             <a:extLst>
               <a:ext uri="{FF2B5EF4-FFF2-40B4-BE49-F238E27FC236}">
-                <a16:creationId xmlns:a16="http://schemas.microsoft.com/office/drawing/2014/main" id="{E8A5A4EE-ABB6-8746-C557-8CE22EBE33A9}"/>
+                <a16:creationId xmlns:a16="http://schemas.microsoft.com/office/drawing/2014/main" id="{68303623-D4CA-69DF-DD1E-522EED2CC88C}"/>
               </a:ext>
             </a:extLst>
           </p:cNvPr>
@@ -48010,7 +48055,7 @@
           <p:cNvPr id="226" name="PlaceHolder 2">
             <a:extLst>
               <a:ext uri="{FF2B5EF4-FFF2-40B4-BE49-F238E27FC236}">
-                <a16:creationId xmlns:a16="http://schemas.microsoft.com/office/drawing/2014/main" id="{E7A283B0-4EEC-A605-802B-A616E7439AA9}"/>
+                <a16:creationId xmlns:a16="http://schemas.microsoft.com/office/drawing/2014/main" id="{FBB90492-B950-FB9A-A58C-AF18A661C0B9}"/>
               </a:ext>
             </a:extLst>
           </p:cNvPr>
@@ -48023,8 +48068,8 @@
         </p:nvSpPr>
         <p:spPr>
           <a:xfrm>
-            <a:off x="1322280" y="2763000"/>
-            <a:ext cx="3646080" cy="3406680"/>
+            <a:off x="275573" y="2388960"/>
+            <a:ext cx="4692787" cy="4200840"/>
           </a:xfrm>
           <a:prstGeom prst="rect">
             <a:avLst/>
@@ -48036,7 +48081,7 @@
         </p:spPr>
         <p:txBody>
           <a:bodyPr anchor="t">
-            <a:normAutofit/>
+            <a:normAutofit lnSpcReduction="10000"/>
           </a:bodyPr>
           <a:lstStyle/>
           <a:p>
@@ -48054,7 +48099,7 @@
               <a:buChar char="•"/>
             </a:pPr>
             <a:r>
-              <a:rPr lang="en-US" sz="1800" b="0" strike="noStrike" spc="49" dirty="0">
+              <a:rPr lang="en-US" b="0" strike="noStrike" spc="49" dirty="0">
                 <a:solidFill>
                   <a:srgbClr val="000000"/>
                 </a:solidFill>
@@ -48064,7 +48109,7 @@
               <a:t>Git is a version </a:t>
             </a:r>
             <a:r>
-              <a:rPr lang="en-US" sz="1800" spc="49" dirty="0">
+              <a:rPr lang="en-US" spc="49" dirty="0">
                 <a:solidFill>
                   <a:srgbClr val="000000"/>
                 </a:solidFill>
@@ -48074,7 +48119,7 @@
               <a:t>c</a:t>
             </a:r>
             <a:r>
-              <a:rPr lang="en-US" sz="1800" b="0" strike="noStrike" spc="49" dirty="0">
+              <a:rPr lang="en-US" b="0" strike="noStrike" spc="49" dirty="0">
                 <a:solidFill>
                   <a:srgbClr val="000000"/>
                 </a:solidFill>
@@ -48099,7 +48144,7 @@
               <a:buChar char="•"/>
             </a:pPr>
             <a:r>
-              <a:rPr lang="en-US" sz="1800" spc="49" dirty="0">
+              <a:rPr lang="en-US" spc="49" dirty="0">
                 <a:solidFill>
                   <a:srgbClr val="000000"/>
                 </a:solidFill>
@@ -48107,7 +48152,7 @@
               </a:rPr>
               <a:t>It tracks changes to files and allows collaboration</a:t>
             </a:r>
-            <a:endParaRPr lang="en-US" sz="1800" b="0" strike="noStrike" spc="-1" dirty="0">
+            <a:endParaRPr lang="en-US" b="0" strike="noStrike" spc="-1" dirty="0">
               <a:solidFill>
                 <a:srgbClr val="000000"/>
               </a:solidFill>
@@ -48129,7 +48174,7 @@
               <a:buChar char="•"/>
             </a:pPr>
             <a:r>
-              <a:rPr lang="en-US" sz="1800" b="0" strike="noStrike" spc="49" dirty="0">
+              <a:rPr lang="en-US" b="0" strike="noStrike" spc="49" dirty="0">
                 <a:solidFill>
                   <a:srgbClr val="000000"/>
                 </a:solidFill>
@@ -48154,7 +48199,7 @@
               <a:buChar char="•"/>
             </a:pPr>
             <a:r>
-              <a:rPr lang="en-US" sz="1800" b="0" strike="noStrike" spc="49" dirty="0">
+              <a:rPr lang="en-US" b="0" strike="noStrike" spc="49" dirty="0">
                 <a:solidFill>
                   <a:srgbClr val="000000"/>
                 </a:solidFill>
@@ -48163,7 +48208,7 @@
               </a:rPr>
               <a:t>Commits create “snapshots” of the entire project, not just the differences</a:t>
             </a:r>
-            <a:endParaRPr lang="en-US" sz="1800" b="0" strike="noStrike" spc="-1" dirty="0">
+            <a:endParaRPr lang="en-US" b="0" strike="noStrike" spc="-1" dirty="0">
               <a:solidFill>
                 <a:srgbClr val="000000"/>
               </a:solidFill>
@@ -48185,7 +48230,7 @@
               <a:buChar char="•"/>
             </a:pPr>
             <a:r>
-              <a:rPr lang="en-US" sz="1800" b="0" strike="noStrike" spc="49" dirty="0">
+              <a:rPr lang="en-US" b="0" strike="noStrike" spc="49" dirty="0">
                 <a:solidFill>
                   <a:srgbClr val="000000"/>
                 </a:solidFill>
@@ -48194,7 +48239,7 @@
               </a:rPr>
               <a:t>Can be stored in a remote location</a:t>
             </a:r>
-            <a:endParaRPr lang="en-US" sz="1800" b="0" strike="noStrike" spc="-1" dirty="0">
+            <a:endParaRPr lang="en-US" b="0" strike="noStrike" spc="-1" dirty="0">
               <a:solidFill>
                 <a:srgbClr val="000000"/>
               </a:solidFill>
@@ -48208,7 +48253,7 @@
           <p:cNvPr id="227" name="PlaceHolder 3">
             <a:extLst>
               <a:ext uri="{FF2B5EF4-FFF2-40B4-BE49-F238E27FC236}">
-                <a16:creationId xmlns:a16="http://schemas.microsoft.com/office/drawing/2014/main" id="{30A63230-373B-26D4-23BE-7CA528D6383A}"/>
+                <a16:creationId xmlns:a16="http://schemas.microsoft.com/office/drawing/2014/main" id="{AB892D7B-DEA5-7E95-6F25-4B76B503DD34}"/>
               </a:ext>
             </a:extLst>
           </p:cNvPr>
@@ -48277,7 +48322,7 @@
           <p:cNvPr id="228" name="Picture 3" descr="Git">
             <a:extLst>
               <a:ext uri="{FF2B5EF4-FFF2-40B4-BE49-F238E27FC236}">
-                <a16:creationId xmlns:a16="http://schemas.microsoft.com/office/drawing/2014/main" id="{400C6D78-0E21-F77F-22D4-6127FDD77FF5}"/>
+                <a16:creationId xmlns:a16="http://schemas.microsoft.com/office/drawing/2014/main" id="{63D208B9-A483-5D5F-6618-7C2F175751BD}"/>
               </a:ext>
             </a:extLst>
           </p:cNvPr>
@@ -48306,7 +48351,7 @@
           <p:cNvPr id="229" name="Picture 4" descr="A screenshot of a diagram&#10;&#10;Description automatically generated">
             <a:extLst>
               <a:ext uri="{FF2B5EF4-FFF2-40B4-BE49-F238E27FC236}">
-                <a16:creationId xmlns:a16="http://schemas.microsoft.com/office/drawing/2014/main" id="{6F2A33ED-2D0F-F693-9F60-B6BFFDCECD14}"/>
+                <a16:creationId xmlns:a16="http://schemas.microsoft.com/office/drawing/2014/main" id="{8C172EC4-AF54-E67B-1733-CFA8846E3AA9}"/>
               </a:ext>
             </a:extLst>
           </p:cNvPr>
@@ -48335,7 +48380,7 @@
           <p:cNvPr id="2" name="Rectangle 1">
             <a:extLst>
               <a:ext uri="{FF2B5EF4-FFF2-40B4-BE49-F238E27FC236}">
-                <a16:creationId xmlns:a16="http://schemas.microsoft.com/office/drawing/2014/main" id="{C8158883-8AA6-029F-11F0-E57A51647FB5}"/>
+                <a16:creationId xmlns:a16="http://schemas.microsoft.com/office/drawing/2014/main" id="{5D2D8374-1385-FEC3-64E7-9C7C97698B3F}"/>
               </a:ext>
             </a:extLst>
           </p:cNvPr>
@@ -48385,7 +48430,7 @@
     </p:spTree>
     <p:extLst>
       <p:ext uri="{BB962C8B-B14F-4D97-AF65-F5344CB8AC3E}">
-        <p14:creationId xmlns:p14="http://schemas.microsoft.com/office/powerpoint/2010/main" val="2988268199"/>
+        <p14:creationId xmlns:p14="http://schemas.microsoft.com/office/powerpoint/2010/main" val="3396096368"/>
       </p:ext>
     </p:extLst>
   </p:cSld>
@@ -48403,7 +48448,7 @@
         <p:cNvPr id="1" name="">
           <a:extLst>
             <a:ext uri="{FF2B5EF4-FFF2-40B4-BE49-F238E27FC236}">
-              <a16:creationId xmlns:a16="http://schemas.microsoft.com/office/drawing/2014/main" id="{ABEF3080-57B8-D298-C020-37405D428A60}"/>
+              <a16:creationId xmlns:a16="http://schemas.microsoft.com/office/drawing/2014/main" id="{5B1D476F-F071-88E8-1501-9DA964370E6B}"/>
             </a:ext>
           </a:extLst>
         </p:cNvPr>
@@ -48423,7 +48468,7 @@
           <p:cNvPr id="225" name="PlaceHolder 1">
             <a:extLst>
               <a:ext uri="{FF2B5EF4-FFF2-40B4-BE49-F238E27FC236}">
-                <a16:creationId xmlns:a16="http://schemas.microsoft.com/office/drawing/2014/main" id="{03247D5A-54D5-0C77-FF0D-CA2AC795F939}"/>
+                <a16:creationId xmlns:a16="http://schemas.microsoft.com/office/drawing/2014/main" id="{ABCC43E2-D00A-DC93-1A18-EB213DF37506}"/>
               </a:ext>
             </a:extLst>
           </p:cNvPr>
@@ -48483,7 +48528,7 @@
           <p:cNvPr id="226" name="PlaceHolder 2">
             <a:extLst>
               <a:ext uri="{FF2B5EF4-FFF2-40B4-BE49-F238E27FC236}">
-                <a16:creationId xmlns:a16="http://schemas.microsoft.com/office/drawing/2014/main" id="{5DD89529-DADB-A556-ABBD-C36936EA1CC3}"/>
+                <a16:creationId xmlns:a16="http://schemas.microsoft.com/office/drawing/2014/main" id="{675D79F8-5AAC-8EB1-55A4-965F6BA7354D}"/>
               </a:ext>
             </a:extLst>
           </p:cNvPr>
@@ -48496,8 +48541,8 @@
         </p:nvSpPr>
         <p:spPr>
           <a:xfrm>
-            <a:off x="1322280" y="2763000"/>
-            <a:ext cx="3646080" cy="3406680"/>
+            <a:off x="275573" y="2388960"/>
+            <a:ext cx="4692787" cy="4200840"/>
           </a:xfrm>
           <a:prstGeom prst="rect">
             <a:avLst/>
@@ -48509,7 +48554,7 @@
         </p:spPr>
         <p:txBody>
           <a:bodyPr anchor="t">
-            <a:normAutofit/>
+            <a:normAutofit lnSpcReduction="10000"/>
           </a:bodyPr>
           <a:lstStyle/>
           <a:p>
@@ -48527,7 +48572,7 @@
               <a:buChar char="•"/>
             </a:pPr>
             <a:r>
-              <a:rPr lang="en-US" sz="1800" b="0" strike="noStrike" spc="49" dirty="0">
+              <a:rPr lang="en-US" b="0" strike="noStrike" spc="49" dirty="0">
                 <a:solidFill>
                   <a:srgbClr val="000000"/>
                 </a:solidFill>
@@ -48537,7 +48582,7 @@
               <a:t>Git is a version </a:t>
             </a:r>
             <a:r>
-              <a:rPr lang="en-US" sz="1800" spc="49" dirty="0">
+              <a:rPr lang="en-US" spc="49" dirty="0">
                 <a:solidFill>
                   <a:srgbClr val="000000"/>
                 </a:solidFill>
@@ -48547,7 +48592,7 @@
               <a:t>c</a:t>
             </a:r>
             <a:r>
-              <a:rPr lang="en-US" sz="1800" b="0" strike="noStrike" spc="49" dirty="0">
+              <a:rPr lang="en-US" b="0" strike="noStrike" spc="49" dirty="0">
                 <a:solidFill>
                   <a:srgbClr val="000000"/>
                 </a:solidFill>
@@ -48572,7 +48617,7 @@
               <a:buChar char="•"/>
             </a:pPr>
             <a:r>
-              <a:rPr lang="en-US" sz="1800" spc="49" dirty="0">
+              <a:rPr lang="en-US" spc="49" dirty="0">
                 <a:solidFill>
                   <a:srgbClr val="000000"/>
                 </a:solidFill>
@@ -48580,7 +48625,7 @@
               </a:rPr>
               <a:t>It tracks changes to files and allows collaboration</a:t>
             </a:r>
-            <a:endParaRPr lang="en-US" sz="1800" b="0" strike="noStrike" spc="-1" dirty="0">
+            <a:endParaRPr lang="en-US" b="0" strike="noStrike" spc="-1" dirty="0">
               <a:solidFill>
                 <a:srgbClr val="000000"/>
               </a:solidFill>
@@ -48602,7 +48647,7 @@
               <a:buChar char="•"/>
             </a:pPr>
             <a:r>
-              <a:rPr lang="en-US" sz="1800" b="0" strike="noStrike" spc="49" dirty="0">
+              <a:rPr lang="en-US" b="0" strike="noStrike" spc="49" dirty="0">
                 <a:solidFill>
                   <a:srgbClr val="000000"/>
                 </a:solidFill>
@@ -48627,7 +48672,7 @@
               <a:buChar char="•"/>
             </a:pPr>
             <a:r>
-              <a:rPr lang="en-US" sz="1800" b="0" strike="noStrike" spc="49" dirty="0">
+              <a:rPr lang="en-US" b="0" strike="noStrike" spc="49" dirty="0">
                 <a:solidFill>
                   <a:srgbClr val="000000"/>
                 </a:solidFill>
@@ -48636,7 +48681,7 @@
               </a:rPr>
               <a:t>Commits create “snapshots” of the entire project, not just the differences</a:t>
             </a:r>
-            <a:endParaRPr lang="en-US" sz="1800" b="0" strike="noStrike" spc="-1" dirty="0">
+            <a:endParaRPr lang="en-US" b="0" strike="noStrike" spc="-1" dirty="0">
               <a:solidFill>
                 <a:srgbClr val="000000"/>
               </a:solidFill>
@@ -48658,7 +48703,7 @@
               <a:buChar char="•"/>
             </a:pPr>
             <a:r>
-              <a:rPr lang="en-US" sz="1800" b="0" strike="noStrike" spc="49" dirty="0">
+              <a:rPr lang="en-US" b="0" strike="noStrike" spc="49" dirty="0">
                 <a:solidFill>
                   <a:srgbClr val="000000"/>
                 </a:solidFill>
@@ -48667,7 +48712,7 @@
               </a:rPr>
               <a:t>Can be stored in a remote location</a:t>
             </a:r>
-            <a:endParaRPr lang="en-US" sz="1800" b="0" strike="noStrike" spc="-1" dirty="0">
+            <a:endParaRPr lang="en-US" b="0" strike="noStrike" spc="-1" dirty="0">
               <a:solidFill>
                 <a:srgbClr val="000000"/>
               </a:solidFill>
@@ -48681,7 +48726,7 @@
           <p:cNvPr id="227" name="PlaceHolder 3">
             <a:extLst>
               <a:ext uri="{FF2B5EF4-FFF2-40B4-BE49-F238E27FC236}">
-                <a16:creationId xmlns:a16="http://schemas.microsoft.com/office/drawing/2014/main" id="{490D6FB8-DB46-62B9-2D76-CF400122819F}"/>
+                <a16:creationId xmlns:a16="http://schemas.microsoft.com/office/drawing/2014/main" id="{7F4E35E7-2D97-AB06-AA00-2B2E383046AD}"/>
               </a:ext>
             </a:extLst>
           </p:cNvPr>
@@ -48750,7 +48795,7 @@
           <p:cNvPr id="228" name="Picture 3" descr="Git">
             <a:extLst>
               <a:ext uri="{FF2B5EF4-FFF2-40B4-BE49-F238E27FC236}">
-                <a16:creationId xmlns:a16="http://schemas.microsoft.com/office/drawing/2014/main" id="{D707B0C5-CFBD-D872-B2CA-F9513F78A483}"/>
+                <a16:creationId xmlns:a16="http://schemas.microsoft.com/office/drawing/2014/main" id="{32E771D0-0E27-8E55-10C4-07D3F021B74B}"/>
               </a:ext>
             </a:extLst>
           </p:cNvPr>
@@ -48779,7 +48824,7 @@
           <p:cNvPr id="229" name="Picture 4" descr="A screenshot of a diagram&#10;&#10;Description automatically generated">
             <a:extLst>
               <a:ext uri="{FF2B5EF4-FFF2-40B4-BE49-F238E27FC236}">
-                <a16:creationId xmlns:a16="http://schemas.microsoft.com/office/drawing/2014/main" id="{762AAD00-D262-3B71-5AE5-A3AB95A9B270}"/>
+                <a16:creationId xmlns:a16="http://schemas.microsoft.com/office/drawing/2014/main" id="{493AF4BF-0E4F-1668-0877-6837F4B9CA30}"/>
               </a:ext>
             </a:extLst>
           </p:cNvPr>
@@ -48808,7 +48853,7 @@
           <p:cNvPr id="2" name="Rectangle 1">
             <a:extLst>
               <a:ext uri="{FF2B5EF4-FFF2-40B4-BE49-F238E27FC236}">
-                <a16:creationId xmlns:a16="http://schemas.microsoft.com/office/drawing/2014/main" id="{A90F2BD0-4435-091B-F976-B298FAB0ABDB}"/>
+                <a16:creationId xmlns:a16="http://schemas.microsoft.com/office/drawing/2014/main" id="{83CC1F38-23C4-FC21-45AA-73753E636248}"/>
               </a:ext>
             </a:extLst>
           </p:cNvPr>
@@ -48817,7 +48862,7 @@
         </p:nvSpPr>
         <p:spPr>
           <a:xfrm>
-            <a:off x="6374296" y="3187080"/>
+            <a:off x="6422580" y="3187080"/>
             <a:ext cx="1232452" cy="2723390"/>
           </a:xfrm>
           <a:prstGeom prst="rect">
@@ -48858,7 +48903,7 @@
     </p:spTree>
     <p:extLst>
       <p:ext uri="{BB962C8B-B14F-4D97-AF65-F5344CB8AC3E}">
-        <p14:creationId xmlns:p14="http://schemas.microsoft.com/office/powerpoint/2010/main" val="71283188"/>
+        <p14:creationId xmlns:p14="http://schemas.microsoft.com/office/powerpoint/2010/main" val="553804680"/>
       </p:ext>
     </p:extLst>
   </p:cSld>
@@ -48876,7 +48921,7 @@
         <p:cNvPr id="1" name="">
           <a:extLst>
             <a:ext uri="{FF2B5EF4-FFF2-40B4-BE49-F238E27FC236}">
-              <a16:creationId xmlns:a16="http://schemas.microsoft.com/office/drawing/2014/main" id="{B8882E6E-879D-746F-7561-D80497AAEA2F}"/>
+              <a16:creationId xmlns:a16="http://schemas.microsoft.com/office/drawing/2014/main" id="{548C4882-C016-FA56-48DB-0A12A2089F9F}"/>
             </a:ext>
           </a:extLst>
         </p:cNvPr>
@@ -48896,7 +48941,7 @@
           <p:cNvPr id="225" name="PlaceHolder 1">
             <a:extLst>
               <a:ext uri="{FF2B5EF4-FFF2-40B4-BE49-F238E27FC236}">
-                <a16:creationId xmlns:a16="http://schemas.microsoft.com/office/drawing/2014/main" id="{503E5D5D-1CD9-D300-4257-A0E31116D604}"/>
+                <a16:creationId xmlns:a16="http://schemas.microsoft.com/office/drawing/2014/main" id="{A3A44F66-FDB7-BFDD-418F-D3091D358A58}"/>
               </a:ext>
             </a:extLst>
           </p:cNvPr>
@@ -48956,7 +49001,7 @@
           <p:cNvPr id="226" name="PlaceHolder 2">
             <a:extLst>
               <a:ext uri="{FF2B5EF4-FFF2-40B4-BE49-F238E27FC236}">
-                <a16:creationId xmlns:a16="http://schemas.microsoft.com/office/drawing/2014/main" id="{74CA814F-399D-0C62-7928-8CBDEBBCC3BB}"/>
+                <a16:creationId xmlns:a16="http://schemas.microsoft.com/office/drawing/2014/main" id="{6A2DEDFE-DCEB-AB6D-72B3-44A7BC950701}"/>
               </a:ext>
             </a:extLst>
           </p:cNvPr>
@@ -48969,8 +49014,8 @@
         </p:nvSpPr>
         <p:spPr>
           <a:xfrm>
-            <a:off x="1322280" y="2763000"/>
-            <a:ext cx="3646080" cy="3406680"/>
+            <a:off x="275573" y="2388960"/>
+            <a:ext cx="4692787" cy="4200840"/>
           </a:xfrm>
           <a:prstGeom prst="rect">
             <a:avLst/>
@@ -48982,7 +49027,7 @@
         </p:spPr>
         <p:txBody>
           <a:bodyPr anchor="t">
-            <a:normAutofit/>
+            <a:normAutofit lnSpcReduction="10000"/>
           </a:bodyPr>
           <a:lstStyle/>
           <a:p>
@@ -49000,7 +49045,7 @@
               <a:buChar char="•"/>
             </a:pPr>
             <a:r>
-              <a:rPr lang="en-US" sz="1800" b="0" strike="noStrike" spc="49" dirty="0">
+              <a:rPr lang="en-US" b="0" strike="noStrike" spc="49" dirty="0">
                 <a:solidFill>
                   <a:srgbClr val="000000"/>
                 </a:solidFill>
@@ -49010,7 +49055,7 @@
               <a:t>Git is a version </a:t>
             </a:r>
             <a:r>
-              <a:rPr lang="en-US" sz="1800" spc="49" dirty="0">
+              <a:rPr lang="en-US" spc="49" dirty="0">
                 <a:solidFill>
                   <a:srgbClr val="000000"/>
                 </a:solidFill>
@@ -49020,7 +49065,7 @@
               <a:t>c</a:t>
             </a:r>
             <a:r>
-              <a:rPr lang="en-US" sz="1800" b="0" strike="noStrike" spc="49" dirty="0">
+              <a:rPr lang="en-US" b="0" strike="noStrike" spc="49" dirty="0">
                 <a:solidFill>
                   <a:srgbClr val="000000"/>
                 </a:solidFill>
@@ -49045,7 +49090,7 @@
               <a:buChar char="•"/>
             </a:pPr>
             <a:r>
-              <a:rPr lang="en-US" sz="1800" spc="49" dirty="0">
+              <a:rPr lang="en-US" spc="49" dirty="0">
                 <a:solidFill>
                   <a:srgbClr val="000000"/>
                 </a:solidFill>
@@ -49053,7 +49098,7 @@
               </a:rPr>
               <a:t>It tracks changes to files and allows collaboration</a:t>
             </a:r>
-            <a:endParaRPr lang="en-US" sz="1800" b="0" strike="noStrike" spc="-1" dirty="0">
+            <a:endParaRPr lang="en-US" b="0" strike="noStrike" spc="-1" dirty="0">
               <a:solidFill>
                 <a:srgbClr val="000000"/>
               </a:solidFill>
@@ -49075,7 +49120,7 @@
               <a:buChar char="•"/>
             </a:pPr>
             <a:r>
-              <a:rPr lang="en-US" sz="1800" b="0" strike="noStrike" spc="49" dirty="0">
+              <a:rPr lang="en-US" b="0" strike="noStrike" spc="49" dirty="0">
                 <a:solidFill>
                   <a:srgbClr val="000000"/>
                 </a:solidFill>
@@ -49100,7 +49145,7 @@
               <a:buChar char="•"/>
             </a:pPr>
             <a:r>
-              <a:rPr lang="en-US" sz="1800" b="0" strike="noStrike" spc="49" dirty="0">
+              <a:rPr lang="en-US" b="0" strike="noStrike" spc="49" dirty="0">
                 <a:solidFill>
                   <a:srgbClr val="000000"/>
                 </a:solidFill>
@@ -49109,7 +49154,7 @@
               </a:rPr>
               <a:t>Commits create “snapshots” of the entire project, not just the differences</a:t>
             </a:r>
-            <a:endParaRPr lang="en-US" sz="1800" b="0" strike="noStrike" spc="-1" dirty="0">
+            <a:endParaRPr lang="en-US" b="0" strike="noStrike" spc="-1" dirty="0">
               <a:solidFill>
                 <a:srgbClr val="000000"/>
               </a:solidFill>
@@ -49131,7 +49176,7 @@
               <a:buChar char="•"/>
             </a:pPr>
             <a:r>
-              <a:rPr lang="en-US" sz="1800" b="0" strike="noStrike" spc="49" dirty="0">
+              <a:rPr lang="en-US" b="0" strike="noStrike" spc="49" dirty="0">
                 <a:solidFill>
                   <a:srgbClr val="000000"/>
                 </a:solidFill>
@@ -49140,7 +49185,7 @@
               </a:rPr>
               <a:t>Can be stored in a remote location</a:t>
             </a:r>
-            <a:endParaRPr lang="en-US" sz="1800" b="0" strike="noStrike" spc="-1" dirty="0">
+            <a:endParaRPr lang="en-US" b="0" strike="noStrike" spc="-1" dirty="0">
               <a:solidFill>
                 <a:srgbClr val="000000"/>
               </a:solidFill>
@@ -49154,7 +49199,7 @@
           <p:cNvPr id="227" name="PlaceHolder 3">
             <a:extLst>
               <a:ext uri="{FF2B5EF4-FFF2-40B4-BE49-F238E27FC236}">
-                <a16:creationId xmlns:a16="http://schemas.microsoft.com/office/drawing/2014/main" id="{1607DCEB-C023-F61A-6E49-CFF922C42397}"/>
+                <a16:creationId xmlns:a16="http://schemas.microsoft.com/office/drawing/2014/main" id="{BAC65308-5993-4AD5-B79B-B41A56BBD492}"/>
               </a:ext>
             </a:extLst>
           </p:cNvPr>
@@ -49223,7 +49268,7 @@
           <p:cNvPr id="228" name="Picture 3" descr="Git">
             <a:extLst>
               <a:ext uri="{FF2B5EF4-FFF2-40B4-BE49-F238E27FC236}">
-                <a16:creationId xmlns:a16="http://schemas.microsoft.com/office/drawing/2014/main" id="{3BE93DD8-98E1-1D64-4707-FF63B1926B91}"/>
+                <a16:creationId xmlns:a16="http://schemas.microsoft.com/office/drawing/2014/main" id="{524C319A-3E52-C094-3D97-B77D21BEF7DC}"/>
               </a:ext>
             </a:extLst>
           </p:cNvPr>
@@ -49252,7 +49297,7 @@
           <p:cNvPr id="229" name="Picture 4" descr="A screenshot of a diagram&#10;&#10;Description automatically generated">
             <a:extLst>
               <a:ext uri="{FF2B5EF4-FFF2-40B4-BE49-F238E27FC236}">
-                <a16:creationId xmlns:a16="http://schemas.microsoft.com/office/drawing/2014/main" id="{30299316-6FDC-9A65-06CD-146298BBD016}"/>
+                <a16:creationId xmlns:a16="http://schemas.microsoft.com/office/drawing/2014/main" id="{1B2AAB2A-2963-BE6E-43DF-7874757DE2AF}"/>
               </a:ext>
             </a:extLst>
           </p:cNvPr>
@@ -49281,7 +49326,7 @@
           <p:cNvPr id="2" name="Rectangle 1">
             <a:extLst>
               <a:ext uri="{FF2B5EF4-FFF2-40B4-BE49-F238E27FC236}">
-                <a16:creationId xmlns:a16="http://schemas.microsoft.com/office/drawing/2014/main" id="{81021394-175B-52E6-B267-91205F9F3EE2}"/>
+                <a16:creationId xmlns:a16="http://schemas.microsoft.com/office/drawing/2014/main" id="{659166EB-7B21-2F4E-153D-47ABEFF54337}"/>
               </a:ext>
             </a:extLst>
           </p:cNvPr>
@@ -49290,7 +49335,7 @@
         </p:nvSpPr>
         <p:spPr>
           <a:xfrm>
-            <a:off x="7659755" y="3187080"/>
+            <a:off x="7734694" y="3187080"/>
             <a:ext cx="1232452" cy="2723390"/>
           </a:xfrm>
           <a:prstGeom prst="rect">
@@ -49331,7 +49376,7 @@
     </p:spTree>
     <p:extLst>
       <p:ext uri="{BB962C8B-B14F-4D97-AF65-F5344CB8AC3E}">
-        <p14:creationId xmlns:p14="http://schemas.microsoft.com/office/powerpoint/2010/main" val="1582185415"/>
+        <p14:creationId xmlns:p14="http://schemas.microsoft.com/office/powerpoint/2010/main" val="109220680"/>
       </p:ext>
     </p:extLst>
   </p:cSld>
@@ -49349,7 +49394,7 @@
         <p:cNvPr id="1" name="">
           <a:extLst>
             <a:ext uri="{FF2B5EF4-FFF2-40B4-BE49-F238E27FC236}">
-              <a16:creationId xmlns:a16="http://schemas.microsoft.com/office/drawing/2014/main" id="{A9BED621-950D-BA2C-012B-3681A3985CAD}"/>
+              <a16:creationId xmlns:a16="http://schemas.microsoft.com/office/drawing/2014/main" id="{BC3CA4F1-02BA-EB53-795C-AFFD4FCE8B31}"/>
             </a:ext>
           </a:extLst>
         </p:cNvPr>
@@ -49369,7 +49414,7 @@
           <p:cNvPr id="225" name="PlaceHolder 1">
             <a:extLst>
               <a:ext uri="{FF2B5EF4-FFF2-40B4-BE49-F238E27FC236}">
-                <a16:creationId xmlns:a16="http://schemas.microsoft.com/office/drawing/2014/main" id="{DAEA32AE-A942-EBF5-05DA-1EF4E18D744E}"/>
+                <a16:creationId xmlns:a16="http://schemas.microsoft.com/office/drawing/2014/main" id="{6643E5F8-6249-69B8-8864-A66AF377F916}"/>
               </a:ext>
             </a:extLst>
           </p:cNvPr>
@@ -49429,7 +49474,7 @@
           <p:cNvPr id="226" name="PlaceHolder 2">
             <a:extLst>
               <a:ext uri="{FF2B5EF4-FFF2-40B4-BE49-F238E27FC236}">
-                <a16:creationId xmlns:a16="http://schemas.microsoft.com/office/drawing/2014/main" id="{5D6EF7D1-735C-8FC0-7D90-2B74B1F8EAA5}"/>
+                <a16:creationId xmlns:a16="http://schemas.microsoft.com/office/drawing/2014/main" id="{E16B395B-A6C5-6347-75C3-746339F9CF19}"/>
               </a:ext>
             </a:extLst>
           </p:cNvPr>
@@ -49442,8 +49487,8 @@
         </p:nvSpPr>
         <p:spPr>
           <a:xfrm>
-            <a:off x="1322280" y="2763000"/>
-            <a:ext cx="3646080" cy="3406680"/>
+            <a:off x="275573" y="2388960"/>
+            <a:ext cx="4692787" cy="4200840"/>
           </a:xfrm>
           <a:prstGeom prst="rect">
             <a:avLst/>
@@ -49455,7 +49500,7 @@
         </p:spPr>
         <p:txBody>
           <a:bodyPr anchor="t">
-            <a:normAutofit/>
+            <a:normAutofit lnSpcReduction="10000"/>
           </a:bodyPr>
           <a:lstStyle/>
           <a:p>
@@ -49473,7 +49518,7 @@
               <a:buChar char="•"/>
             </a:pPr>
             <a:r>
-              <a:rPr lang="en-US" sz="1800" b="0" strike="noStrike" spc="49" dirty="0">
+              <a:rPr lang="en-US" b="0" strike="noStrike" spc="49" dirty="0">
                 <a:solidFill>
                   <a:srgbClr val="000000"/>
                 </a:solidFill>
@@ -49483,7 +49528,7 @@
               <a:t>Git is a version </a:t>
             </a:r>
             <a:r>
-              <a:rPr lang="en-US" sz="1800" spc="49" dirty="0">
+              <a:rPr lang="en-US" spc="49" dirty="0">
                 <a:solidFill>
                   <a:srgbClr val="000000"/>
                 </a:solidFill>
@@ -49493,7 +49538,7 @@
               <a:t>c</a:t>
             </a:r>
             <a:r>
-              <a:rPr lang="en-US" sz="1800" b="0" strike="noStrike" spc="49" dirty="0">
+              <a:rPr lang="en-US" b="0" strike="noStrike" spc="49" dirty="0">
                 <a:solidFill>
                   <a:srgbClr val="000000"/>
                 </a:solidFill>
@@ -49518,7 +49563,7 @@
               <a:buChar char="•"/>
             </a:pPr>
             <a:r>
-              <a:rPr lang="en-US" sz="1800" spc="49" dirty="0">
+              <a:rPr lang="en-US" spc="49" dirty="0">
                 <a:solidFill>
                   <a:srgbClr val="000000"/>
                 </a:solidFill>
@@ -49526,7 +49571,7 @@
               </a:rPr>
               <a:t>It tracks changes to files and allows collaboration</a:t>
             </a:r>
-            <a:endParaRPr lang="en-US" sz="1800" b="0" strike="noStrike" spc="-1" dirty="0">
+            <a:endParaRPr lang="en-US" b="0" strike="noStrike" spc="-1" dirty="0">
               <a:solidFill>
                 <a:srgbClr val="000000"/>
               </a:solidFill>
@@ -49548,7 +49593,7 @@
               <a:buChar char="•"/>
             </a:pPr>
             <a:r>
-              <a:rPr lang="en-US" sz="1800" b="0" strike="noStrike" spc="49" dirty="0">
+              <a:rPr lang="en-US" b="0" strike="noStrike" spc="49" dirty="0">
                 <a:solidFill>
                   <a:srgbClr val="000000"/>
                 </a:solidFill>
@@ -49573,7 +49618,7 @@
               <a:buChar char="•"/>
             </a:pPr>
             <a:r>
-              <a:rPr lang="en-US" sz="1800" b="0" strike="noStrike" spc="49" dirty="0">
+              <a:rPr lang="en-US" b="0" strike="noStrike" spc="49" dirty="0">
                 <a:solidFill>
                   <a:srgbClr val="000000"/>
                 </a:solidFill>
@@ -49582,7 +49627,7 @@
               </a:rPr>
               <a:t>Commits create “snapshots” of the entire project, not just the differences</a:t>
             </a:r>
-            <a:endParaRPr lang="en-US" sz="1800" b="0" strike="noStrike" spc="-1" dirty="0">
+            <a:endParaRPr lang="en-US" b="0" strike="noStrike" spc="-1" dirty="0">
               <a:solidFill>
                 <a:srgbClr val="000000"/>
               </a:solidFill>
@@ -49604,7 +49649,7 @@
               <a:buChar char="•"/>
             </a:pPr>
             <a:r>
-              <a:rPr lang="en-US" sz="1800" b="0" strike="noStrike" spc="49" dirty="0">
+              <a:rPr lang="en-US" b="0" strike="noStrike" spc="49" dirty="0">
                 <a:solidFill>
                   <a:srgbClr val="000000"/>
                 </a:solidFill>
@@ -49613,7 +49658,7 @@
               </a:rPr>
               <a:t>Can be stored in a remote location</a:t>
             </a:r>
-            <a:endParaRPr lang="en-US" sz="1800" b="0" strike="noStrike" spc="-1" dirty="0">
+            <a:endParaRPr lang="en-US" b="0" strike="noStrike" spc="-1" dirty="0">
               <a:solidFill>
                 <a:srgbClr val="000000"/>
               </a:solidFill>
@@ -49627,7 +49672,7 @@
           <p:cNvPr id="227" name="PlaceHolder 3">
             <a:extLst>
               <a:ext uri="{FF2B5EF4-FFF2-40B4-BE49-F238E27FC236}">
-                <a16:creationId xmlns:a16="http://schemas.microsoft.com/office/drawing/2014/main" id="{DB64755D-4AAB-47C3-BABF-3F60F8DE1359}"/>
+                <a16:creationId xmlns:a16="http://schemas.microsoft.com/office/drawing/2014/main" id="{4C0FF6BC-31C6-6BB5-5223-25D95EAFB391}"/>
               </a:ext>
             </a:extLst>
           </p:cNvPr>
@@ -49696,7 +49741,7 @@
           <p:cNvPr id="228" name="Picture 3" descr="Git">
             <a:extLst>
               <a:ext uri="{FF2B5EF4-FFF2-40B4-BE49-F238E27FC236}">
-                <a16:creationId xmlns:a16="http://schemas.microsoft.com/office/drawing/2014/main" id="{464A140D-C0DC-250F-542F-C68D4223EA4B}"/>
+                <a16:creationId xmlns:a16="http://schemas.microsoft.com/office/drawing/2014/main" id="{86436075-C55A-B1E8-A3B6-7B6BE7C95270}"/>
               </a:ext>
             </a:extLst>
           </p:cNvPr>
@@ -49725,7 +49770,7 @@
           <p:cNvPr id="229" name="Picture 4" descr="A screenshot of a diagram&#10;&#10;Description automatically generated">
             <a:extLst>
               <a:ext uri="{FF2B5EF4-FFF2-40B4-BE49-F238E27FC236}">
-                <a16:creationId xmlns:a16="http://schemas.microsoft.com/office/drawing/2014/main" id="{55CFC68E-646A-5A55-8A66-4AEECEA21FB5}"/>
+                <a16:creationId xmlns:a16="http://schemas.microsoft.com/office/drawing/2014/main" id="{9C73AF84-EB46-FA03-5031-5A25904BE6D0}"/>
               </a:ext>
             </a:extLst>
           </p:cNvPr>
@@ -49754,7 +49799,7 @@
           <p:cNvPr id="2" name="Rectangle 1">
             <a:extLst>
               <a:ext uri="{FF2B5EF4-FFF2-40B4-BE49-F238E27FC236}">
-                <a16:creationId xmlns:a16="http://schemas.microsoft.com/office/drawing/2014/main" id="{CAF778D0-9E5A-50F2-4C4B-F8A6CC13877B}"/>
+                <a16:creationId xmlns:a16="http://schemas.microsoft.com/office/drawing/2014/main" id="{17FC14BC-A00F-81DB-3567-EBFF3E9CC60C}"/>
               </a:ext>
             </a:extLst>
           </p:cNvPr>
@@ -49763,7 +49808,7 @@
         </p:nvSpPr>
         <p:spPr>
           <a:xfrm>
-            <a:off x="8958467" y="3187080"/>
+            <a:off x="9039881" y="3187080"/>
             <a:ext cx="1232452" cy="2723390"/>
           </a:xfrm>
           <a:prstGeom prst="rect">
@@ -49804,7 +49849,7 @@
     </p:spTree>
     <p:extLst>
       <p:ext uri="{BB962C8B-B14F-4D97-AF65-F5344CB8AC3E}">
-        <p14:creationId xmlns:p14="http://schemas.microsoft.com/office/powerpoint/2010/main" val="1750598797"/>
+        <p14:creationId xmlns:p14="http://schemas.microsoft.com/office/powerpoint/2010/main" val="166818798"/>
       </p:ext>
     </p:extLst>
   </p:cSld>

</xml_diff>